<commit_message>
Added link to the channel on Teams.
This change was committed to Slide 17 (Notta bene).
</commit_message>
<xml_diff>
--- a/Presentations/1. Introduction to Client Side Scripting.pptx
+++ b/Presentations/1. Introduction to Client Side Scripting.pptx
@@ -408,7 +408,7 @@
           <p:cNvPr id="5" name="Rectangle 4">
             <a:extLst>
               <a:ext uri="{FF2B5EF4-FFF2-40B4-BE49-F238E27FC236}">
-                <a16:creationId xmlns:a16="http://schemas.microsoft.com/office/drawing/2014/main" xmlns="" id="{904DB13E-F722-4ED6-BB00-556651E95281}"/>
+                <a16:creationId xmlns="" xmlns:a16="http://schemas.microsoft.com/office/drawing/2014/main" id="{904DB13E-F722-4ED6-BB00-556651E95281}"/>
               </a:ext>
             </a:extLst>
           </p:cNvPr>
@@ -557,7 +557,7 @@
           <p:cNvPr id="7" name="Group 6">
             <a:extLst>
               <a:ext uri="{FF2B5EF4-FFF2-40B4-BE49-F238E27FC236}">
-                <a16:creationId xmlns:a16="http://schemas.microsoft.com/office/drawing/2014/main" xmlns="" id="{E26428D7-C6F3-473D-A360-A3F5C3E8728C}"/>
+                <a16:creationId xmlns="" xmlns:a16="http://schemas.microsoft.com/office/drawing/2014/main" id="{E26428D7-C6F3-473D-A360-A3F5C3E8728C}"/>
               </a:ext>
             </a:extLst>
           </p:cNvPr>
@@ -855,7 +855,7 @@
           <a:p>
             <a:fld id="{EA0C0817-A112-4847-8014-A94B7D2A4EA3}" type="datetime1">
               <a:rPr lang="en-US" smtClean="0"/>
-              <a:t>3/2/2021</a:t>
+              <a:t>3/3/2021</a:t>
             </a:fld>
             <a:endParaRPr lang="en-US" dirty="0"/>
           </a:p>
@@ -1057,7 +1057,7 @@
           <a:p>
             <a:fld id="{7332B432-ACDA-4023-A761-2BAB76577B62}" type="datetime1">
               <a:rPr lang="en-US" smtClean="0"/>
-              <a:t>3/2/2021</a:t>
+              <a:t>3/3/2021</a:t>
             </a:fld>
             <a:endParaRPr lang="en-US" dirty="0"/>
           </a:p>
@@ -1140,7 +1140,7 @@
           <p:cNvPr id="15" name="Rectangle 14">
             <a:extLst>
               <a:ext uri="{FF2B5EF4-FFF2-40B4-BE49-F238E27FC236}">
-                <a16:creationId xmlns:a16="http://schemas.microsoft.com/office/drawing/2014/main" xmlns="" id="{0A4A1889-E37C-4EC3-9E41-9DAD221CF389}"/>
+                <a16:creationId xmlns="" xmlns:a16="http://schemas.microsoft.com/office/drawing/2014/main" id="{0A4A1889-E37C-4EC3-9E41-9DAD221CF389}"/>
               </a:ext>
             </a:extLst>
           </p:cNvPr>
@@ -1337,7 +1337,7 @@
           <p:cNvPr id="16" name="Group 15">
             <a:extLst>
               <a:ext uri="{FF2B5EF4-FFF2-40B4-BE49-F238E27FC236}">
-                <a16:creationId xmlns:a16="http://schemas.microsoft.com/office/drawing/2014/main" xmlns="" id="{1683EB04-C23E-490C-A1A6-030CF79D23C8}"/>
+                <a16:creationId xmlns="" xmlns:a16="http://schemas.microsoft.com/office/drawing/2014/main" id="{1683EB04-C23E-490C-A1A6-030CF79D23C8}"/>
               </a:ext>
             </a:extLst>
           </p:cNvPr>
@@ -1357,7 +1357,7 @@
             <p:cNvPr id="17" name="Straight Connector 16">
               <a:extLst>
                 <a:ext uri="{FF2B5EF4-FFF2-40B4-BE49-F238E27FC236}">
-                  <a16:creationId xmlns:a16="http://schemas.microsoft.com/office/drawing/2014/main" xmlns="" id="{F8A84C03-E1CA-4A4E-81D6-9BB0C335B7A0}"/>
+                  <a16:creationId xmlns="" xmlns:a16="http://schemas.microsoft.com/office/drawing/2014/main" id="{F8A84C03-E1CA-4A4E-81D6-9BB0C335B7A0}"/>
                 </a:ext>
               </a:extLst>
             </p:cNvPr>
@@ -1405,7 +1405,7 @@
             <p:cNvPr id="18" name="Straight Connector 17">
               <a:extLst>
                 <a:ext uri="{FF2B5EF4-FFF2-40B4-BE49-F238E27FC236}">
-                  <a16:creationId xmlns:a16="http://schemas.microsoft.com/office/drawing/2014/main" xmlns="" id="{4A26FB5A-D5D1-4DAB-AC43-7F51A7F2D197}"/>
+                  <a16:creationId xmlns="" xmlns:a16="http://schemas.microsoft.com/office/drawing/2014/main" id="{4A26FB5A-D5D1-4DAB-AC43-7F51A7F2D197}"/>
                 </a:ext>
               </a:extLst>
             </p:cNvPr>
@@ -1453,7 +1453,7 @@
             <p:cNvPr id="19" name="Straight Connector 18">
               <a:extLst>
                 <a:ext uri="{FF2B5EF4-FFF2-40B4-BE49-F238E27FC236}">
-                  <a16:creationId xmlns:a16="http://schemas.microsoft.com/office/drawing/2014/main" xmlns="" id="{49303F14-E560-4C02-94F4-B4695FE26813}"/>
+                  <a16:creationId xmlns="" xmlns:a16="http://schemas.microsoft.com/office/drawing/2014/main" id="{49303F14-E560-4C02-94F4-B4695FE26813}"/>
                 </a:ext>
               </a:extLst>
             </p:cNvPr>
@@ -1656,7 +1656,7 @@
           <a:p>
             <a:fld id="{D9C646AA-F36E-4540-911D-FFFC0A0EF24A}" type="datetime1">
               <a:rPr lang="en-US" smtClean="0"/>
-              <a:t>3/2/2021</a:t>
+              <a:t>3/3/2021</a:t>
             </a:fld>
             <a:endParaRPr lang="en-US" dirty="0"/>
           </a:p>
@@ -1976,7 +1976,7 @@
           <a:p>
             <a:fld id="{69186D26-FA5F-4637-B602-B7C2DC34CFD4}" type="datetime1">
               <a:rPr lang="en-US" smtClean="0"/>
-              <a:t>3/2/2021</a:t>
+              <a:t>3/3/2021</a:t>
             </a:fld>
             <a:endParaRPr lang="en-US" dirty="0"/>
           </a:p>
@@ -2413,7 +2413,7 @@
           <a:p>
             <a:fld id="{8A7F15D8-96D1-4781-BC50-CA8A088B2FE4}" type="datetime1">
               <a:rPr lang="en-US" smtClean="0"/>
-              <a:t>3/2/2021</a:t>
+              <a:t>3/3/2021</a:t>
             </a:fld>
             <a:endParaRPr lang="en-US" dirty="0"/>
           </a:p>
@@ -2531,7 +2531,7 @@
           <a:p>
             <a:fld id="{F9A96C99-B8F8-4528-BD05-0E16E943DC09}" type="datetime1">
               <a:rPr lang="en-US" smtClean="0"/>
-              <a:t>3/2/2021</a:t>
+              <a:t>3/3/2021</a:t>
             </a:fld>
             <a:endParaRPr lang="en-US" dirty="0"/>
           </a:p>
@@ -2626,7 +2626,7 @@
           <a:p>
             <a:fld id="{03636942-C211-4B28-8DBD-C953E00AF71B}" type="datetime1">
               <a:rPr lang="en-US" smtClean="0"/>
-              <a:t>3/2/2021</a:t>
+              <a:t>3/3/2021</a:t>
             </a:fld>
             <a:endParaRPr lang="en-US" dirty="0"/>
           </a:p>
@@ -2709,7 +2709,7 @@
           <p:cNvPr id="10" name="Rectangle 9">
             <a:extLst>
               <a:ext uri="{FF2B5EF4-FFF2-40B4-BE49-F238E27FC236}">
-                <a16:creationId xmlns:a16="http://schemas.microsoft.com/office/drawing/2014/main" xmlns="" id="{D5E1BBF9-8BEF-4353-BA68-30AAF9EBD8D8}"/>
+                <a16:creationId xmlns="" xmlns:a16="http://schemas.microsoft.com/office/drawing/2014/main" id="{D5E1BBF9-8BEF-4353-BA68-30AAF9EBD8D8}"/>
               </a:ext>
             </a:extLst>
           </p:cNvPr>
@@ -2756,7 +2756,7 @@
           <p:cNvPr id="13" name="Rectangle 12">
             <a:extLst>
               <a:ext uri="{FF2B5EF4-FFF2-40B4-BE49-F238E27FC236}">
-                <a16:creationId xmlns:a16="http://schemas.microsoft.com/office/drawing/2014/main" xmlns="" id="{5B941C21-2A5D-4912-AB06-1BB0C0EB6AE1}"/>
+                <a16:creationId xmlns="" xmlns:a16="http://schemas.microsoft.com/office/drawing/2014/main" id="{5B941C21-2A5D-4912-AB06-1BB0C0EB6AE1}"/>
               </a:ext>
             </a:extLst>
           </p:cNvPr>
@@ -3043,7 +3043,7 @@
           <a:p>
             <a:fld id="{7E8D12A6-918A-48BD-8CB9-CA713993B0EA}" type="datetime1">
               <a:rPr lang="en-US" smtClean="0"/>
-              <a:t>3/2/2021</a:t>
+              <a:t>3/3/2021</a:t>
             </a:fld>
             <a:endParaRPr lang="en-US" dirty="0"/>
           </a:p>
@@ -3151,7 +3151,7 @@
           <p:cNvPr id="11" name="Rectangle 10">
             <a:extLst>
               <a:ext uri="{FF2B5EF4-FFF2-40B4-BE49-F238E27FC236}">
-                <a16:creationId xmlns:a16="http://schemas.microsoft.com/office/drawing/2014/main" xmlns="" id="{E687CA98-D9C7-497F-A1DA-7D22F8753BCE}"/>
+                <a16:creationId xmlns="" xmlns:a16="http://schemas.microsoft.com/office/drawing/2014/main" id="{E687CA98-D9C7-497F-A1DA-7D22F8753BCE}"/>
               </a:ext>
             </a:extLst>
           </p:cNvPr>
@@ -3304,7 +3304,7 @@
             <a:fld id="{E778CE86-875F-4587-BCF6-FA054AFC0D53}" type="datetime1">
               <a:rPr lang="en-US" smtClean="0"/>
               <a:pPr/>
-              <a:t>3/2/2021</a:t>
+              <a:t>3/3/2021</a:t>
             </a:fld>
             <a:endParaRPr lang="en-US" dirty="0"/>
           </a:p>
@@ -3386,7 +3386,7 @@
           <p:cNvPr id="12" name="Rectangle 11">
             <a:extLst>
               <a:ext uri="{FF2B5EF4-FFF2-40B4-BE49-F238E27FC236}">
-                <a16:creationId xmlns:a16="http://schemas.microsoft.com/office/drawing/2014/main" xmlns="" id="{F8B3D8CC-BB13-41A5-8F34-B8E84A4F9534}"/>
+                <a16:creationId xmlns="" xmlns:a16="http://schemas.microsoft.com/office/drawing/2014/main" id="{F8B3D8CC-BB13-41A5-8F34-B8E84A4F9534}"/>
               </a:ext>
             </a:extLst>
           </p:cNvPr>
@@ -3588,7 +3588,7 @@
           <p:cNvPr id="9" name="Rectangle 8">
             <a:extLst>
               <a:ext uri="{FF2B5EF4-FFF2-40B4-BE49-F238E27FC236}">
-                <a16:creationId xmlns:a16="http://schemas.microsoft.com/office/drawing/2014/main" xmlns="" id="{1E94681D-2A4C-4A8D-B9B5-31D440D0328D}"/>
+                <a16:creationId xmlns="" xmlns:a16="http://schemas.microsoft.com/office/drawing/2014/main" id="{1E94681D-2A4C-4A8D-B9B5-31D440D0328D}"/>
               </a:ext>
             </a:extLst>
           </p:cNvPr>
@@ -3820,7 +3820,7 @@
           <a:p>
             <a:fld id="{F6FA2B21-3FCD-4721-B95C-427943F61125}" type="datetime1">
               <a:rPr lang="en-US" smtClean="0"/>
-              <a:t>3/2/2021</a:t>
+              <a:t>3/3/2021</a:t>
             </a:fld>
             <a:endParaRPr lang="en-US" dirty="0"/>
           </a:p>
@@ -4300,7 +4300,7 @@
           <p:cNvPr id="6" name="Picture 5" descr="abstract image">
             <a:extLst>
               <a:ext uri="{FF2B5EF4-FFF2-40B4-BE49-F238E27FC236}">
-                <a16:creationId xmlns:a16="http://schemas.microsoft.com/office/drawing/2014/main" xmlns="" id="{8045422F-7258-40AC-BD2E-2469AA448922}"/>
+                <a16:creationId xmlns="" xmlns:a16="http://schemas.microsoft.com/office/drawing/2014/main" id="{8045422F-7258-40AC-BD2E-2469AA448922}"/>
               </a:ext>
             </a:extLst>
           </p:cNvPr>
@@ -4335,10 +4335,10 @@
           <p:cNvPr id="82" name="Rectangle 81">
             <a:extLst>
               <a:ext uri="{FF2B5EF4-FFF2-40B4-BE49-F238E27FC236}">
-                <a16:creationId xmlns:a16="http://schemas.microsoft.com/office/drawing/2014/main" xmlns="" id="{2644B391-9BFE-445C-A9EC-F544BB85FBC7}"/>
+                <a16:creationId xmlns="" xmlns:a16="http://schemas.microsoft.com/office/drawing/2014/main" id="{2644B391-9BFE-445C-A9EC-F544BB85FBC7}"/>
               </a:ext>
               <a:ext uri="{C183D7F6-B498-43B3-948B-1728B52AA6E4}">
-                <adec:decorative xmlns:adec="http://schemas.microsoft.com/office/drawing/2017/decorative" xmlns="" val="1"/>
+                <adec:decorative xmlns="" xmlns:adec="http://schemas.microsoft.com/office/drawing/2017/decorative" val="1"/>
               </a:ext>
             </a:extLst>
           </p:cNvPr>
@@ -4348,7 +4348,7 @@
           <p:nvPr>
             <p:extLst>
               <p:ext uri="{386F3935-93C4-4BCD-93E2-E3B085C9AB24}">
-                <p16:designElem xmlns:p16="http://schemas.microsoft.com/office/powerpoint/2015/main" xmlns="" val="1"/>
+                <p16:designElem xmlns="" xmlns:p16="http://schemas.microsoft.com/office/powerpoint/2015/main" val="1"/>
               </p:ext>
             </p:extLst>
           </p:nvPr>
@@ -4380,10 +4380,10 @@
           <p:cNvPr id="84" name="Rectangle 83">
             <a:extLst>
               <a:ext uri="{FF2B5EF4-FFF2-40B4-BE49-F238E27FC236}">
-                <a16:creationId xmlns:a16="http://schemas.microsoft.com/office/drawing/2014/main" xmlns="" id="{80F26E69-87D9-4655-AE7B-280A87AA3CAD}"/>
+                <a16:creationId xmlns="" xmlns:a16="http://schemas.microsoft.com/office/drawing/2014/main" id="{80F26E69-87D9-4655-AE7B-280A87AA3CAD}"/>
               </a:ext>
               <a:ext uri="{C183D7F6-B498-43B3-948B-1728B52AA6E4}">
-                <adec:decorative xmlns:adec="http://schemas.microsoft.com/office/drawing/2017/decorative" xmlns="" val="1"/>
+                <adec:decorative xmlns="" xmlns:adec="http://schemas.microsoft.com/office/drawing/2017/decorative" val="1"/>
               </a:ext>
             </a:extLst>
           </p:cNvPr>
@@ -4393,7 +4393,7 @@
           <p:nvPr>
             <p:extLst>
               <p:ext uri="{386F3935-93C4-4BCD-93E2-E3B085C9AB24}">
-                <p16:designElem xmlns:p16="http://schemas.microsoft.com/office/powerpoint/2015/main" xmlns="" val="1"/>
+                <p16:designElem xmlns="" xmlns:p16="http://schemas.microsoft.com/office/powerpoint/2015/main" val="1"/>
               </p:ext>
             </p:extLst>
           </p:nvPr>
@@ -4424,7 +4424,7 @@
           <p:cNvPr id="2" name="Title 1">
             <a:extLst>
               <a:ext uri="{FF2B5EF4-FFF2-40B4-BE49-F238E27FC236}">
-                <a16:creationId xmlns:a16="http://schemas.microsoft.com/office/drawing/2014/main" xmlns="" id="{18C3B467-088C-4F3D-A9A7-105C4E1E20CD}"/>
+                <a16:creationId xmlns="" xmlns:a16="http://schemas.microsoft.com/office/drawing/2014/main" id="{18C3B467-088C-4F3D-A9A7-105C4E1E20CD}"/>
               </a:ext>
             </a:extLst>
           </p:cNvPr>
@@ -4463,7 +4463,7 @@
           <p:cNvPr id="3" name="Subtitle 2">
             <a:extLst>
               <a:ext uri="{FF2B5EF4-FFF2-40B4-BE49-F238E27FC236}">
-                <a16:creationId xmlns:a16="http://schemas.microsoft.com/office/drawing/2014/main" xmlns="" id="{C8722DDC-8EEE-4A06-8DFE-B44871EAA2CF}"/>
+                <a16:creationId xmlns="" xmlns:a16="http://schemas.microsoft.com/office/drawing/2014/main" id="{C8722DDC-8EEE-4A06-8DFE-B44871EAA2CF}"/>
               </a:ext>
             </a:extLst>
           </p:cNvPr>
@@ -4755,7 +4755,6 @@
               <a:rPr lang="en-GB" dirty="0"/>
               <a:t> </a:t>
             </a:r>
-            <a:endParaRPr lang="en-GB" dirty="0"/>
           </a:p>
           <a:p>
             <a:pPr marL="0" indent="0" algn="just" fontAlgn="base">
@@ -5647,7 +5646,6 @@
               <a:rPr lang="en-GB" sz="1500" dirty="0"/>
               <a:t>web browser to view changes. </a:t>
             </a:r>
-            <a:endParaRPr lang="en-GB" sz="1500" dirty="0"/>
           </a:p>
           <a:p>
             <a:pPr marL="274320" lvl="1" indent="0" algn="just">
@@ -5683,23 +5681,7 @@
                   <a:srgbClr val="FF0000"/>
                 </a:solidFill>
               </a:rPr>
-              <a:t>, Chromium. </a:t>
-            </a:r>
-            <a:r>
-              <a:rPr lang="en-GB" b="1" dirty="0">
-                <a:solidFill>
-                  <a:srgbClr val="FF0000"/>
-                </a:solidFill>
-              </a:rPr>
-              <a:t>It has website development tools, such as testing how your website would look like on certain devices such as iPhone X, iPad Pro, etc. </a:t>
-            </a:r>
-            <a:r>
-              <a:rPr lang="en-GB" b="1" dirty="0">
-                <a:solidFill>
-                  <a:srgbClr val="FF0000"/>
-                </a:solidFill>
-              </a:rPr>
-              <a:t>Custom screen resolutions can also be taken into consideration</a:t>
+              <a:t>, Chromium. It has website development tools, such as testing how your website would look like on certain devices such as iPhone X, iPad Pro, etc. Custom screen resolutions can also be taken into consideration</a:t>
             </a:r>
             <a:r>
               <a:rPr lang="en-GB" b="1" dirty="0" smtClean="0">
@@ -5930,7 +5912,20 @@
               <a:rPr lang="en-GB" dirty="0" smtClean="0">
                 <a:sym typeface="Wingdings" panose="05000000000000000000" pitchFamily="2" charset="2"/>
               </a:rPr>
-              <a:t>Sessions will be recorded and will be available via Client Side Scripting (2021) channel in Microsoft Teams.</a:t>
+              <a:t>Sessions will be recorded and will be available via </a:t>
+            </a:r>
+            <a:r>
+              <a:rPr lang="en-GB" dirty="0" smtClean="0">
+                <a:sym typeface="Wingdings" panose="05000000000000000000" pitchFamily="2" charset="2"/>
+                <a:hlinkClick r:id="rId3"/>
+              </a:rPr>
+              <a:t>Client Side Scripting (2021) channel </a:t>
+            </a:r>
+            <a:r>
+              <a:rPr lang="en-GB" dirty="0" smtClean="0">
+                <a:sym typeface="Wingdings" panose="05000000000000000000" pitchFamily="2" charset="2"/>
+              </a:rPr>
+              <a:t>in Microsoft Teams.</a:t>
             </a:r>
           </a:p>
           <a:p>
@@ -6149,7 +6144,7 @@
           <p:cNvPr id="2" name="Title 1">
             <a:extLst>
               <a:ext uri="{FF2B5EF4-FFF2-40B4-BE49-F238E27FC236}">
-                <a16:creationId xmlns:a16="http://schemas.microsoft.com/office/drawing/2014/main" xmlns="" id="{A7EA2130-8C50-451E-AD98-86D9CCC6CDE5}"/>
+                <a16:creationId xmlns="" xmlns:a16="http://schemas.microsoft.com/office/drawing/2014/main" id="{A7EA2130-8C50-451E-AD98-86D9CCC6CDE5}"/>
               </a:ext>
             </a:extLst>
           </p:cNvPr>
@@ -6178,7 +6173,7 @@
           <p:cNvPr id="3" name="Content Placeholder 2">
             <a:extLst>
               <a:ext uri="{FF2B5EF4-FFF2-40B4-BE49-F238E27FC236}">
-                <a16:creationId xmlns:a16="http://schemas.microsoft.com/office/drawing/2014/main" xmlns="" id="{259EA294-3165-4296-86D0-CE3F628B30BC}"/>
+                <a16:creationId xmlns="" xmlns:a16="http://schemas.microsoft.com/office/drawing/2014/main" id="{259EA294-3165-4296-86D0-CE3F628B30BC}"/>
               </a:ext>
             </a:extLst>
           </p:cNvPr>
@@ -6210,7 +6205,7 @@
           <p:cNvPr id="4098" name="Picture 2" descr="Web Development – BR Marketing Agency">
             <a:extLst>
               <a:ext uri="{FF2B5EF4-FFF2-40B4-BE49-F238E27FC236}">
-                <a16:creationId xmlns:a16="http://schemas.microsoft.com/office/drawing/2014/main" xmlns="" id="{06A7DE03-A3F8-4E2D-8844-359BBCC88E26}"/>
+                <a16:creationId xmlns="" xmlns:a16="http://schemas.microsoft.com/office/drawing/2014/main" id="{06A7DE03-A3F8-4E2D-8844-359BBCC88E26}"/>
               </a:ext>
             </a:extLst>
           </p:cNvPr>
@@ -6257,7 +6252,7 @@
           <p:cNvPr id="4100" name="Picture 4">
             <a:extLst>
               <a:ext uri="{FF2B5EF4-FFF2-40B4-BE49-F238E27FC236}">
-                <a16:creationId xmlns:a16="http://schemas.microsoft.com/office/drawing/2014/main" xmlns="" id="{FA7787B2-1E09-495D-9B32-5F11E7C8444C}"/>
+                <a16:creationId xmlns="" xmlns:a16="http://schemas.microsoft.com/office/drawing/2014/main" id="{FA7787B2-1E09-495D-9B32-5F11E7C8444C}"/>
               </a:ext>
             </a:extLst>
           </p:cNvPr>
@@ -6304,7 +6299,7 @@
           <p:cNvPr id="4102" name="Picture 6" descr="Download LAUGHiNG EMOJi Free PNG transparent image and clipart">
             <a:extLst>
               <a:ext uri="{FF2B5EF4-FFF2-40B4-BE49-F238E27FC236}">
-                <a16:creationId xmlns:a16="http://schemas.microsoft.com/office/drawing/2014/main" xmlns="" id="{D96E4A16-B244-4C77-8CDF-BA0EB168B924}"/>
+                <a16:creationId xmlns="" xmlns:a16="http://schemas.microsoft.com/office/drawing/2014/main" id="{D96E4A16-B244-4C77-8CDF-BA0EB168B924}"/>
               </a:ext>
             </a:extLst>
           </p:cNvPr>
@@ -6389,7 +6384,7 @@
           <p:cNvPr id="2" name="Title 1">
             <a:extLst>
               <a:ext uri="{FF2B5EF4-FFF2-40B4-BE49-F238E27FC236}">
-                <a16:creationId xmlns:a16="http://schemas.microsoft.com/office/drawing/2014/main" xmlns="" id="{7A4919D0-F177-4BBA-9A0B-DBA69E2ED764}"/>
+                <a16:creationId xmlns="" xmlns:a16="http://schemas.microsoft.com/office/drawing/2014/main" id="{7A4919D0-F177-4BBA-9A0B-DBA69E2ED764}"/>
               </a:ext>
             </a:extLst>
           </p:cNvPr>
@@ -6425,7 +6420,7 @@
           <p:cNvPr id="1028" name="Picture 4" descr="C Programming Icon - Free Download, PNG and Vector">
             <a:extLst>
               <a:ext uri="{FF2B5EF4-FFF2-40B4-BE49-F238E27FC236}">
-                <a16:creationId xmlns:a16="http://schemas.microsoft.com/office/drawing/2014/main" xmlns="" id="{F42FB096-928E-4EBD-9C66-8ADE97C8E707}"/>
+                <a16:creationId xmlns="" xmlns:a16="http://schemas.microsoft.com/office/drawing/2014/main" id="{F42FB096-928E-4EBD-9C66-8ADE97C8E707}"/>
               </a:ext>
             </a:extLst>
           </p:cNvPr>
@@ -6472,7 +6467,7 @@
           <p:cNvPr id="1030" name="Picture 6" descr="MCAST – The Malta College of Arts, Science &amp; Technology">
             <a:extLst>
               <a:ext uri="{FF2B5EF4-FFF2-40B4-BE49-F238E27FC236}">
-                <a16:creationId xmlns:a16="http://schemas.microsoft.com/office/drawing/2014/main" xmlns="" id="{73FA3B68-8505-4659-BFAB-89D914506E25}"/>
+                <a16:creationId xmlns="" xmlns:a16="http://schemas.microsoft.com/office/drawing/2014/main" id="{73FA3B68-8505-4659-BFAB-89D914506E25}"/>
               </a:ext>
             </a:extLst>
           </p:cNvPr>
@@ -6519,7 +6514,7 @@
           <p:cNvPr id="7" name="TextBox 6">
             <a:extLst>
               <a:ext uri="{FF2B5EF4-FFF2-40B4-BE49-F238E27FC236}">
-                <a16:creationId xmlns:a16="http://schemas.microsoft.com/office/drawing/2014/main" xmlns="" id="{59637C6C-7474-436F-A8DC-2F7B578BADB8}"/>
+                <a16:creationId xmlns="" xmlns:a16="http://schemas.microsoft.com/office/drawing/2014/main" id="{59637C6C-7474-436F-A8DC-2F7B578BADB8}"/>
               </a:ext>
             </a:extLst>
           </p:cNvPr>
@@ -6560,7 +6555,7 @@
           <p:cNvPr id="11" name="TextBox 10">
             <a:extLst>
               <a:ext uri="{FF2B5EF4-FFF2-40B4-BE49-F238E27FC236}">
-                <a16:creationId xmlns:a16="http://schemas.microsoft.com/office/drawing/2014/main" xmlns="" id="{30BCBBD9-909E-406E-8676-FD33687AC91B}"/>
+                <a16:creationId xmlns="" xmlns:a16="http://schemas.microsoft.com/office/drawing/2014/main" id="{30BCBBD9-909E-406E-8676-FD33687AC91B}"/>
               </a:ext>
             </a:extLst>
           </p:cNvPr>
@@ -6634,7 +6629,7 @@
           <p:cNvPr id="2" name="Title 1">
             <a:extLst>
               <a:ext uri="{FF2B5EF4-FFF2-40B4-BE49-F238E27FC236}">
-                <a16:creationId xmlns:a16="http://schemas.microsoft.com/office/drawing/2014/main" xmlns="" id="{209DA1CA-47D3-4D05-B217-1D3D6340DA60}"/>
+                <a16:creationId xmlns="" xmlns:a16="http://schemas.microsoft.com/office/drawing/2014/main" id="{209DA1CA-47D3-4D05-B217-1D3D6340DA60}"/>
               </a:ext>
             </a:extLst>
           </p:cNvPr>
@@ -6664,7 +6659,7 @@
           <p:cNvPr id="3" name="Content Placeholder 2">
             <a:extLst>
               <a:ext uri="{FF2B5EF4-FFF2-40B4-BE49-F238E27FC236}">
-                <a16:creationId xmlns:a16="http://schemas.microsoft.com/office/drawing/2014/main" xmlns="" id="{639DBA77-9546-4615-9910-9191654884F4}"/>
+                <a16:creationId xmlns="" xmlns:a16="http://schemas.microsoft.com/office/drawing/2014/main" id="{639DBA77-9546-4615-9910-9191654884F4}"/>
               </a:ext>
             </a:extLst>
           </p:cNvPr>
@@ -6736,7 +6731,7 @@
           <p:cNvPr id="2050" name="Picture 2" descr="Pacman PNG Transparent Images | PNG All">
             <a:extLst>
               <a:ext uri="{FF2B5EF4-FFF2-40B4-BE49-F238E27FC236}">
-                <a16:creationId xmlns:a16="http://schemas.microsoft.com/office/drawing/2014/main" xmlns="" id="{7515CF2C-6BF3-40B9-B65D-FAA2CD1B6149}"/>
+                <a16:creationId xmlns="" xmlns:a16="http://schemas.microsoft.com/office/drawing/2014/main" id="{7515CF2C-6BF3-40B9-B65D-FAA2CD1B6149}"/>
               </a:ext>
             </a:extLst>
           </p:cNvPr>
@@ -6783,7 +6778,7 @@
           <p:cNvPr id="2052" name="Picture 4" descr="STRING_SPLIT – New function in SQL Server 2016 - Simple BI Insights">
             <a:extLst>
               <a:ext uri="{FF2B5EF4-FFF2-40B4-BE49-F238E27FC236}">
-                <a16:creationId xmlns:a16="http://schemas.microsoft.com/office/drawing/2014/main" xmlns="" id="{71147A6D-9DA5-44A3-B742-706E37917183}"/>
+                <a16:creationId xmlns="" xmlns:a16="http://schemas.microsoft.com/office/drawing/2014/main" id="{71147A6D-9DA5-44A3-B742-706E37917183}"/>
               </a:ext>
             </a:extLst>
           </p:cNvPr>
@@ -6830,7 +6825,7 @@
           <p:cNvPr id="2054" name="Picture 6" descr="Html5 Js Css3 Logo Png">
             <a:extLst>
               <a:ext uri="{FF2B5EF4-FFF2-40B4-BE49-F238E27FC236}">
-                <a16:creationId xmlns:a16="http://schemas.microsoft.com/office/drawing/2014/main" xmlns="" id="{749567B7-FE78-4927-AF0A-C2D0FBA81B85}"/>
+                <a16:creationId xmlns="" xmlns:a16="http://schemas.microsoft.com/office/drawing/2014/main" id="{749567B7-FE78-4927-AF0A-C2D0FBA81B85}"/>
               </a:ext>
             </a:extLst>
           </p:cNvPr>
@@ -6914,7 +6909,7 @@
           <p:cNvPr id="2" name="Title 1">
             <a:extLst>
               <a:ext uri="{FF2B5EF4-FFF2-40B4-BE49-F238E27FC236}">
-                <a16:creationId xmlns:a16="http://schemas.microsoft.com/office/drawing/2014/main" xmlns="" id="{4889FEBC-A69A-4797-B8DC-F4B395652789}"/>
+                <a16:creationId xmlns="" xmlns:a16="http://schemas.microsoft.com/office/drawing/2014/main" id="{4889FEBC-A69A-4797-B8DC-F4B395652789}"/>
               </a:ext>
             </a:extLst>
           </p:cNvPr>
@@ -6944,7 +6939,7 @@
           <p:cNvPr id="3074" name="Picture 2" descr="Volo Media Ltd">
             <a:extLst>
               <a:ext uri="{FF2B5EF4-FFF2-40B4-BE49-F238E27FC236}">
-                <a16:creationId xmlns:a16="http://schemas.microsoft.com/office/drawing/2014/main" xmlns="" id="{BA229DD6-CF23-437B-A451-61EB32F02DB5}"/>
+                <a16:creationId xmlns="" xmlns:a16="http://schemas.microsoft.com/office/drawing/2014/main" id="{BA229DD6-CF23-437B-A451-61EB32F02DB5}"/>
               </a:ext>
             </a:extLst>
           </p:cNvPr>
@@ -6990,7 +6985,7 @@
           <p:cNvPr id="3076" name="Picture 4" descr="The Expatriates Unit is Moving | Identity Malta Agency">
             <a:extLst>
               <a:ext uri="{FF2B5EF4-FFF2-40B4-BE49-F238E27FC236}">
-                <a16:creationId xmlns:a16="http://schemas.microsoft.com/office/drawing/2014/main" xmlns="" id="{A9B93970-B8A9-48CC-BE47-4932186D0E86}"/>
+                <a16:creationId xmlns="" xmlns:a16="http://schemas.microsoft.com/office/drawing/2014/main" id="{A9B93970-B8A9-48CC-BE47-4932186D0E86}"/>
               </a:ext>
             </a:extLst>
           </p:cNvPr>
@@ -7036,7 +7031,7 @@
           <p:cNvPr id="4" name="TextBox 3">
             <a:extLst>
               <a:ext uri="{FF2B5EF4-FFF2-40B4-BE49-F238E27FC236}">
-                <a16:creationId xmlns:a16="http://schemas.microsoft.com/office/drawing/2014/main" xmlns="" id="{3B8E3796-AD26-4CE1-863F-B774C603C88A}"/>
+                <a16:creationId xmlns="" xmlns:a16="http://schemas.microsoft.com/office/drawing/2014/main" id="{3B8E3796-AD26-4CE1-863F-B774C603C88A}"/>
               </a:ext>
             </a:extLst>
           </p:cNvPr>
@@ -7171,7 +7166,7 @@
           <p:cNvPr id="2" name="Title 1">
             <a:extLst>
               <a:ext uri="{FF2B5EF4-FFF2-40B4-BE49-F238E27FC236}">
-                <a16:creationId xmlns:a16="http://schemas.microsoft.com/office/drawing/2014/main" xmlns="" id="{C147DAC6-CE16-464E-B5F7-9AF616F8E344}"/>
+                <a16:creationId xmlns="" xmlns:a16="http://schemas.microsoft.com/office/drawing/2014/main" id="{C147DAC6-CE16-464E-B5F7-9AF616F8E344}"/>
               </a:ext>
             </a:extLst>
           </p:cNvPr>
@@ -7207,7 +7202,7 @@
           <p:cNvPr id="3" name="Content Placeholder 2">
             <a:extLst>
               <a:ext uri="{FF2B5EF4-FFF2-40B4-BE49-F238E27FC236}">
-                <a16:creationId xmlns:a16="http://schemas.microsoft.com/office/drawing/2014/main" xmlns="" id="{4B168DC9-6117-41A0-BD4F-7F02B94E446E}"/>
+                <a16:creationId xmlns="" xmlns:a16="http://schemas.microsoft.com/office/drawing/2014/main" id="{4B168DC9-6117-41A0-BD4F-7F02B94E446E}"/>
               </a:ext>
             </a:extLst>
           </p:cNvPr>
@@ -7292,7 +7287,7 @@
           <p:cNvPr id="2" name="Title 1">
             <a:extLst>
               <a:ext uri="{FF2B5EF4-FFF2-40B4-BE49-F238E27FC236}">
-                <a16:creationId xmlns:a16="http://schemas.microsoft.com/office/drawing/2014/main" xmlns="" id="{EFB4BB4F-2949-44F7-AB57-F37817610597}"/>
+                <a16:creationId xmlns="" xmlns:a16="http://schemas.microsoft.com/office/drawing/2014/main" id="{EFB4BB4F-2949-44F7-AB57-F37817610597}"/>
               </a:ext>
             </a:extLst>
           </p:cNvPr>
@@ -7321,7 +7316,7 @@
           <p:cNvPr id="3" name="Content Placeholder 2">
             <a:extLst>
               <a:ext uri="{FF2B5EF4-FFF2-40B4-BE49-F238E27FC236}">
-                <a16:creationId xmlns:a16="http://schemas.microsoft.com/office/drawing/2014/main" xmlns="" id="{016F4155-F3AA-4278-813E-93BF917DA27E}"/>
+                <a16:creationId xmlns="" xmlns:a16="http://schemas.microsoft.com/office/drawing/2014/main" id="{016F4155-F3AA-4278-813E-93BF917DA27E}"/>
               </a:ext>
             </a:extLst>
           </p:cNvPr>
@@ -8063,6 +8058,23 @@
 </file>
 
 <file path=customXml/item1.xml><?xml version="1.0" encoding="utf-8"?>
+<p:properties xmlns:p="http://schemas.microsoft.com/office/2006/metadata/properties" xmlns:xsi="http://www.w3.org/2001/XMLSchema-instance" xmlns:pc="http://schemas.microsoft.com/office/infopath/2007/PartnerControls">
+  <documentManagement>
+    <MediaServiceKeyPoints xmlns="d9d9ac22-6b23-4745-92ea-c69becf7e4b2" xsi:nil="true"/>
+  </documentManagement>
+</p:properties>
+</file>
+
+<file path=customXml/item2.xml><?xml version="1.0" encoding="utf-8"?>
+<?mso-contentType ?>
+<FormTemplates xmlns="http://schemas.microsoft.com/sharepoint/v3/contenttype/forms">
+  <Display>DocumentLibraryForm</Display>
+  <Edit>DocumentLibraryForm</Edit>
+  <New>DocumentLibraryForm</New>
+</FormTemplates>
+</file>
+
+<file path=customXml/item3.xml><?xml version="1.0" encoding="utf-8"?>
 <ct:contentTypeSchema xmlns:ct="http://schemas.microsoft.com/office/2006/metadata/contentType" xmlns:ma="http://schemas.microsoft.com/office/2006/metadata/properties/metaAttributes" ct:_="" ma:_="" ma:contentTypeName="Document" ma:contentTypeID="0x01010099EA05292F43AC468E47792DE7151F8D" ma:contentTypeVersion="13" ma:contentTypeDescription="Create a new document." ma:contentTypeScope="" ma:versionID="803ad2c30b9a0a334f48b490dafeb011">
   <xsd:schema xmlns:xsd="http://www.w3.org/2001/XMLSchema" xmlns:xs="http://www.w3.org/2001/XMLSchema" xmlns:p="http://schemas.microsoft.com/office/2006/metadata/properties" xmlns:ns3="d9d9ac22-6b23-4745-92ea-c69becf7e4b2" xmlns:ns4="45676021-86ec-45db-8abb-edbe2c2c4101" targetNamespace="http://schemas.microsoft.com/office/2006/metadata/properties" ma:root="true" ma:fieldsID="3af67083b40321adf5c8791a7cec23ac" ns3:_="" ns4:_="">
     <xsd:import namespace="d9d9ac22-6b23-4745-92ea-c69becf7e4b2"/>
@@ -8285,24 +8297,32 @@
 </ct:contentTypeSchema>
 </file>
 
-<file path=customXml/item2.xml><?xml version="1.0" encoding="utf-8"?>
-<?mso-contentType ?>
-<FormTemplates xmlns="http://schemas.microsoft.com/sharepoint/v3/contenttype/forms">
-  <Display>DocumentLibraryForm</Display>
-  <Edit>DocumentLibraryForm</Edit>
-  <New>DocumentLibraryForm</New>
-</FormTemplates>
+<file path=customXml/itemProps1.xml><?xml version="1.0" encoding="utf-8"?>
+<ds:datastoreItem xmlns:ds="http://schemas.openxmlformats.org/officeDocument/2006/customXml" ds:itemID="{137651BA-F45C-4845-9AB3-E0A65B39F5E1}">
+  <ds:schemaRefs>
+    <ds:schemaRef ds:uri="http://schemas.microsoft.com/office/2006/metadata/properties"/>
+    <ds:schemaRef ds:uri="http://purl.org/dc/terms/"/>
+    <ds:schemaRef ds:uri="d9d9ac22-6b23-4745-92ea-c69becf7e4b2"/>
+    <ds:schemaRef ds:uri="45676021-86ec-45db-8abb-edbe2c2c4101"/>
+    <ds:schemaRef ds:uri="http://schemas.microsoft.com/office/2006/documentManagement/types"/>
+    <ds:schemaRef ds:uri="http://schemas.microsoft.com/office/infopath/2007/PartnerControls"/>
+    <ds:schemaRef ds:uri="http://purl.org/dc/elements/1.1/"/>
+    <ds:schemaRef ds:uri="http://schemas.openxmlformats.org/package/2006/metadata/core-properties"/>
+    <ds:schemaRef ds:uri="http://www.w3.org/XML/1998/namespace"/>
+    <ds:schemaRef ds:uri="http://purl.org/dc/dcmitype/"/>
+  </ds:schemaRefs>
+</ds:datastoreItem>
 </file>
 
-<file path=customXml/item3.xml><?xml version="1.0" encoding="utf-8"?>
-<p:properties xmlns:p="http://schemas.microsoft.com/office/2006/metadata/properties" xmlns:xsi="http://www.w3.org/2001/XMLSchema-instance" xmlns:pc="http://schemas.microsoft.com/office/infopath/2007/PartnerControls">
-  <documentManagement>
-    <MediaServiceKeyPoints xmlns="d9d9ac22-6b23-4745-92ea-c69becf7e4b2" xsi:nil="true"/>
-  </documentManagement>
-</p:properties>
+<file path=customXml/itemProps2.xml><?xml version="1.0" encoding="utf-8"?>
+<ds:datastoreItem xmlns:ds="http://schemas.openxmlformats.org/officeDocument/2006/customXml" ds:itemID="{CDB58277-F8DF-46FF-84EC-EF41B835E69F}">
+  <ds:schemaRefs>
+    <ds:schemaRef ds:uri="http://schemas.microsoft.com/sharepoint/v3/contenttype/forms"/>
+  </ds:schemaRefs>
+</ds:datastoreItem>
 </file>
 
-<file path=customXml/itemProps1.xml><?xml version="1.0" encoding="utf-8"?>
+<file path=customXml/itemProps3.xml><?xml version="1.0" encoding="utf-8"?>
 <ds:datastoreItem xmlns:ds="http://schemas.openxmlformats.org/officeDocument/2006/customXml" ds:itemID="{8D891A2C-7683-4A63-9EAA-400EA9F04214}">
   <ds:schemaRefs>
     <ds:schemaRef ds:uri="http://schemas.microsoft.com/office/2006/metadata/contentType"/>
@@ -8319,29 +8339,4 @@
     <ds:schemaRef ds:uri="http://schemas.microsoft.com/internal/obd"/>
   </ds:schemaRefs>
 </ds:datastoreItem>
-</file>
-
-<file path=customXml/itemProps2.xml><?xml version="1.0" encoding="utf-8"?>
-<ds:datastoreItem xmlns:ds="http://schemas.openxmlformats.org/officeDocument/2006/customXml" ds:itemID="{CDB58277-F8DF-46FF-84EC-EF41B835E69F}">
-  <ds:schemaRefs>
-    <ds:schemaRef ds:uri="http://schemas.microsoft.com/sharepoint/v3/contenttype/forms"/>
-  </ds:schemaRefs>
-</ds:datastoreItem>
-</file>
-
-<file path=customXml/itemProps3.xml><?xml version="1.0" encoding="utf-8"?>
-<ds:datastoreItem xmlns:ds="http://schemas.openxmlformats.org/officeDocument/2006/customXml" ds:itemID="{137651BA-F45C-4845-9AB3-E0A65B39F5E1}">
-  <ds:schemaRefs>
-    <ds:schemaRef ds:uri="http://schemas.microsoft.com/office/2006/metadata/properties"/>
-    <ds:schemaRef ds:uri="http://purl.org/dc/terms/"/>
-    <ds:schemaRef ds:uri="d9d9ac22-6b23-4745-92ea-c69becf7e4b2"/>
-    <ds:schemaRef ds:uri="45676021-86ec-45db-8abb-edbe2c2c4101"/>
-    <ds:schemaRef ds:uri="http://schemas.microsoft.com/office/2006/documentManagement/types"/>
-    <ds:schemaRef ds:uri="http://schemas.microsoft.com/office/infopath/2007/PartnerControls"/>
-    <ds:schemaRef ds:uri="http://purl.org/dc/elements/1.1/"/>
-    <ds:schemaRef ds:uri="http://schemas.openxmlformats.org/package/2006/metadata/core-properties"/>
-    <ds:schemaRef ds:uri="http://www.w3.org/XML/1998/namespace"/>
-    <ds:schemaRef ds:uri="http://purl.org/dc/dcmitype/"/>
-  </ds:schemaRefs>
-</ds:datastoreItem>
 </file>
</xml_diff>

<commit_message>
GitHub presentation is complete.
I will give further updates regarding the installation of GitHub Desktop as I need to see the 'out-of-box' experience, particularly the authentication details part.
</commit_message>
<xml_diff>
--- a/Presentations/1. Introduction to Client Side Scripting.pptx
+++ b/Presentations/1. Introduction to Client Side Scripting.pptx
@@ -408,7 +408,7 @@
           <p:cNvPr id="5" name="Rectangle 4">
             <a:extLst>
               <a:ext uri="{FF2B5EF4-FFF2-40B4-BE49-F238E27FC236}">
-                <a16:creationId xmlns="" xmlns:a16="http://schemas.microsoft.com/office/drawing/2014/main" id="{904DB13E-F722-4ED6-BB00-556651E95281}"/>
+                <a16:creationId xmlns:a16="http://schemas.microsoft.com/office/drawing/2014/main" id="{904DB13E-F722-4ED6-BB00-556651E95281}"/>
               </a:ext>
             </a:extLst>
           </p:cNvPr>
@@ -557,7 +557,7 @@
           <p:cNvPr id="7" name="Group 6">
             <a:extLst>
               <a:ext uri="{FF2B5EF4-FFF2-40B4-BE49-F238E27FC236}">
-                <a16:creationId xmlns="" xmlns:a16="http://schemas.microsoft.com/office/drawing/2014/main" id="{E26428D7-C6F3-473D-A360-A3F5C3E8728C}"/>
+                <a16:creationId xmlns:a16="http://schemas.microsoft.com/office/drawing/2014/main" id="{E26428D7-C6F3-473D-A360-A3F5C3E8728C}"/>
               </a:ext>
             </a:extLst>
           </p:cNvPr>
@@ -855,7 +855,7 @@
           <a:p>
             <a:fld id="{EA0C0817-A112-4847-8014-A94B7D2A4EA3}" type="datetime1">
               <a:rPr lang="en-US" smtClean="0"/>
-              <a:t>3/3/2021</a:t>
+              <a:t>3/5/2021</a:t>
             </a:fld>
             <a:endParaRPr lang="en-US" dirty="0"/>
           </a:p>
@@ -1057,7 +1057,7 @@
           <a:p>
             <a:fld id="{7332B432-ACDA-4023-A761-2BAB76577B62}" type="datetime1">
               <a:rPr lang="en-US" smtClean="0"/>
-              <a:t>3/3/2021</a:t>
+              <a:t>3/5/2021</a:t>
             </a:fld>
             <a:endParaRPr lang="en-US" dirty="0"/>
           </a:p>
@@ -1140,7 +1140,7 @@
           <p:cNvPr id="15" name="Rectangle 14">
             <a:extLst>
               <a:ext uri="{FF2B5EF4-FFF2-40B4-BE49-F238E27FC236}">
-                <a16:creationId xmlns="" xmlns:a16="http://schemas.microsoft.com/office/drawing/2014/main" id="{0A4A1889-E37C-4EC3-9E41-9DAD221CF389}"/>
+                <a16:creationId xmlns:a16="http://schemas.microsoft.com/office/drawing/2014/main" id="{0A4A1889-E37C-4EC3-9E41-9DAD221CF389}"/>
               </a:ext>
             </a:extLst>
           </p:cNvPr>
@@ -1337,7 +1337,7 @@
           <p:cNvPr id="16" name="Group 15">
             <a:extLst>
               <a:ext uri="{FF2B5EF4-FFF2-40B4-BE49-F238E27FC236}">
-                <a16:creationId xmlns="" xmlns:a16="http://schemas.microsoft.com/office/drawing/2014/main" id="{1683EB04-C23E-490C-A1A6-030CF79D23C8}"/>
+                <a16:creationId xmlns:a16="http://schemas.microsoft.com/office/drawing/2014/main" id="{1683EB04-C23E-490C-A1A6-030CF79D23C8}"/>
               </a:ext>
             </a:extLst>
           </p:cNvPr>
@@ -1357,7 +1357,7 @@
             <p:cNvPr id="17" name="Straight Connector 16">
               <a:extLst>
                 <a:ext uri="{FF2B5EF4-FFF2-40B4-BE49-F238E27FC236}">
-                  <a16:creationId xmlns="" xmlns:a16="http://schemas.microsoft.com/office/drawing/2014/main" id="{F8A84C03-E1CA-4A4E-81D6-9BB0C335B7A0}"/>
+                  <a16:creationId xmlns:a16="http://schemas.microsoft.com/office/drawing/2014/main" id="{F8A84C03-E1CA-4A4E-81D6-9BB0C335B7A0}"/>
                 </a:ext>
               </a:extLst>
             </p:cNvPr>
@@ -1405,7 +1405,7 @@
             <p:cNvPr id="18" name="Straight Connector 17">
               <a:extLst>
                 <a:ext uri="{FF2B5EF4-FFF2-40B4-BE49-F238E27FC236}">
-                  <a16:creationId xmlns="" xmlns:a16="http://schemas.microsoft.com/office/drawing/2014/main" id="{4A26FB5A-D5D1-4DAB-AC43-7F51A7F2D197}"/>
+                  <a16:creationId xmlns:a16="http://schemas.microsoft.com/office/drawing/2014/main" id="{4A26FB5A-D5D1-4DAB-AC43-7F51A7F2D197}"/>
                 </a:ext>
               </a:extLst>
             </p:cNvPr>
@@ -1453,7 +1453,7 @@
             <p:cNvPr id="19" name="Straight Connector 18">
               <a:extLst>
                 <a:ext uri="{FF2B5EF4-FFF2-40B4-BE49-F238E27FC236}">
-                  <a16:creationId xmlns="" xmlns:a16="http://schemas.microsoft.com/office/drawing/2014/main" id="{49303F14-E560-4C02-94F4-B4695FE26813}"/>
+                  <a16:creationId xmlns:a16="http://schemas.microsoft.com/office/drawing/2014/main" id="{49303F14-E560-4C02-94F4-B4695FE26813}"/>
                 </a:ext>
               </a:extLst>
             </p:cNvPr>
@@ -1656,7 +1656,7 @@
           <a:p>
             <a:fld id="{D9C646AA-F36E-4540-911D-FFFC0A0EF24A}" type="datetime1">
               <a:rPr lang="en-US" smtClean="0"/>
-              <a:t>3/3/2021</a:t>
+              <a:t>3/5/2021</a:t>
             </a:fld>
             <a:endParaRPr lang="en-US" dirty="0"/>
           </a:p>
@@ -1976,7 +1976,7 @@
           <a:p>
             <a:fld id="{69186D26-FA5F-4637-B602-B7C2DC34CFD4}" type="datetime1">
               <a:rPr lang="en-US" smtClean="0"/>
-              <a:t>3/3/2021</a:t>
+              <a:t>3/5/2021</a:t>
             </a:fld>
             <a:endParaRPr lang="en-US" dirty="0"/>
           </a:p>
@@ -2413,7 +2413,7 @@
           <a:p>
             <a:fld id="{8A7F15D8-96D1-4781-BC50-CA8A088B2FE4}" type="datetime1">
               <a:rPr lang="en-US" smtClean="0"/>
-              <a:t>3/3/2021</a:t>
+              <a:t>3/5/2021</a:t>
             </a:fld>
             <a:endParaRPr lang="en-US" dirty="0"/>
           </a:p>
@@ -2531,7 +2531,7 @@
           <a:p>
             <a:fld id="{F9A96C99-B8F8-4528-BD05-0E16E943DC09}" type="datetime1">
               <a:rPr lang="en-US" smtClean="0"/>
-              <a:t>3/3/2021</a:t>
+              <a:t>3/5/2021</a:t>
             </a:fld>
             <a:endParaRPr lang="en-US" dirty="0"/>
           </a:p>
@@ -2626,7 +2626,7 @@
           <a:p>
             <a:fld id="{03636942-C211-4B28-8DBD-C953E00AF71B}" type="datetime1">
               <a:rPr lang="en-US" smtClean="0"/>
-              <a:t>3/3/2021</a:t>
+              <a:t>3/5/2021</a:t>
             </a:fld>
             <a:endParaRPr lang="en-US" dirty="0"/>
           </a:p>
@@ -2709,7 +2709,7 @@
           <p:cNvPr id="10" name="Rectangle 9">
             <a:extLst>
               <a:ext uri="{FF2B5EF4-FFF2-40B4-BE49-F238E27FC236}">
-                <a16:creationId xmlns="" xmlns:a16="http://schemas.microsoft.com/office/drawing/2014/main" id="{D5E1BBF9-8BEF-4353-BA68-30AAF9EBD8D8}"/>
+                <a16:creationId xmlns:a16="http://schemas.microsoft.com/office/drawing/2014/main" id="{D5E1BBF9-8BEF-4353-BA68-30AAF9EBD8D8}"/>
               </a:ext>
             </a:extLst>
           </p:cNvPr>
@@ -2756,7 +2756,7 @@
           <p:cNvPr id="13" name="Rectangle 12">
             <a:extLst>
               <a:ext uri="{FF2B5EF4-FFF2-40B4-BE49-F238E27FC236}">
-                <a16:creationId xmlns="" xmlns:a16="http://schemas.microsoft.com/office/drawing/2014/main" id="{5B941C21-2A5D-4912-AB06-1BB0C0EB6AE1}"/>
+                <a16:creationId xmlns:a16="http://schemas.microsoft.com/office/drawing/2014/main" id="{5B941C21-2A5D-4912-AB06-1BB0C0EB6AE1}"/>
               </a:ext>
             </a:extLst>
           </p:cNvPr>
@@ -3043,7 +3043,7 @@
           <a:p>
             <a:fld id="{7E8D12A6-918A-48BD-8CB9-CA713993B0EA}" type="datetime1">
               <a:rPr lang="en-US" smtClean="0"/>
-              <a:t>3/3/2021</a:t>
+              <a:t>3/5/2021</a:t>
             </a:fld>
             <a:endParaRPr lang="en-US" dirty="0"/>
           </a:p>
@@ -3151,7 +3151,7 @@
           <p:cNvPr id="11" name="Rectangle 10">
             <a:extLst>
               <a:ext uri="{FF2B5EF4-FFF2-40B4-BE49-F238E27FC236}">
-                <a16:creationId xmlns="" xmlns:a16="http://schemas.microsoft.com/office/drawing/2014/main" id="{E687CA98-D9C7-497F-A1DA-7D22F8753BCE}"/>
+                <a16:creationId xmlns:a16="http://schemas.microsoft.com/office/drawing/2014/main" id="{E687CA98-D9C7-497F-A1DA-7D22F8753BCE}"/>
               </a:ext>
             </a:extLst>
           </p:cNvPr>
@@ -3304,7 +3304,7 @@
             <a:fld id="{E778CE86-875F-4587-BCF6-FA054AFC0D53}" type="datetime1">
               <a:rPr lang="en-US" smtClean="0"/>
               <a:pPr/>
-              <a:t>3/3/2021</a:t>
+              <a:t>3/5/2021</a:t>
             </a:fld>
             <a:endParaRPr lang="en-US" dirty="0"/>
           </a:p>
@@ -3386,7 +3386,7 @@
           <p:cNvPr id="12" name="Rectangle 11">
             <a:extLst>
               <a:ext uri="{FF2B5EF4-FFF2-40B4-BE49-F238E27FC236}">
-                <a16:creationId xmlns="" xmlns:a16="http://schemas.microsoft.com/office/drawing/2014/main" id="{F8B3D8CC-BB13-41A5-8F34-B8E84A4F9534}"/>
+                <a16:creationId xmlns:a16="http://schemas.microsoft.com/office/drawing/2014/main" id="{F8B3D8CC-BB13-41A5-8F34-B8E84A4F9534}"/>
               </a:ext>
             </a:extLst>
           </p:cNvPr>
@@ -3588,7 +3588,7 @@
           <p:cNvPr id="9" name="Rectangle 8">
             <a:extLst>
               <a:ext uri="{FF2B5EF4-FFF2-40B4-BE49-F238E27FC236}">
-                <a16:creationId xmlns="" xmlns:a16="http://schemas.microsoft.com/office/drawing/2014/main" id="{1E94681D-2A4C-4A8D-B9B5-31D440D0328D}"/>
+                <a16:creationId xmlns:a16="http://schemas.microsoft.com/office/drawing/2014/main" id="{1E94681D-2A4C-4A8D-B9B5-31D440D0328D}"/>
               </a:ext>
             </a:extLst>
           </p:cNvPr>
@@ -3820,7 +3820,7 @@
           <a:p>
             <a:fld id="{F6FA2B21-3FCD-4721-B95C-427943F61125}" type="datetime1">
               <a:rPr lang="en-US" smtClean="0"/>
-              <a:t>3/3/2021</a:t>
+              <a:t>3/5/2021</a:t>
             </a:fld>
             <a:endParaRPr lang="en-US" dirty="0"/>
           </a:p>
@@ -4300,7 +4300,7 @@
           <p:cNvPr id="6" name="Picture 5" descr="abstract image">
             <a:extLst>
               <a:ext uri="{FF2B5EF4-FFF2-40B4-BE49-F238E27FC236}">
-                <a16:creationId xmlns="" xmlns:a16="http://schemas.microsoft.com/office/drawing/2014/main" id="{8045422F-7258-40AC-BD2E-2469AA448922}"/>
+                <a16:creationId xmlns:a16="http://schemas.microsoft.com/office/drawing/2014/main" id="{8045422F-7258-40AC-BD2E-2469AA448922}"/>
               </a:ext>
             </a:extLst>
           </p:cNvPr>
@@ -4335,10 +4335,10 @@
           <p:cNvPr id="82" name="Rectangle 81">
             <a:extLst>
               <a:ext uri="{FF2B5EF4-FFF2-40B4-BE49-F238E27FC236}">
-                <a16:creationId xmlns="" xmlns:a16="http://schemas.microsoft.com/office/drawing/2014/main" id="{2644B391-9BFE-445C-A9EC-F544BB85FBC7}"/>
+                <a16:creationId xmlns:a16="http://schemas.microsoft.com/office/drawing/2014/main" id="{2644B391-9BFE-445C-A9EC-F544BB85FBC7}"/>
               </a:ext>
               <a:ext uri="{C183D7F6-B498-43B3-948B-1728B52AA6E4}">
-                <adec:decorative xmlns="" xmlns:adec="http://schemas.microsoft.com/office/drawing/2017/decorative" val="1"/>
+                <adec:decorative xmlns:adec="http://schemas.microsoft.com/office/drawing/2017/decorative" val="1"/>
               </a:ext>
             </a:extLst>
           </p:cNvPr>
@@ -4348,7 +4348,7 @@
           <p:nvPr>
             <p:extLst>
               <p:ext uri="{386F3935-93C4-4BCD-93E2-E3B085C9AB24}">
-                <p16:designElem xmlns="" xmlns:p16="http://schemas.microsoft.com/office/powerpoint/2015/main" val="1"/>
+                <p16:designElem xmlns:p16="http://schemas.microsoft.com/office/powerpoint/2015/main" val="1"/>
               </p:ext>
             </p:extLst>
           </p:nvPr>
@@ -4380,10 +4380,10 @@
           <p:cNvPr id="84" name="Rectangle 83">
             <a:extLst>
               <a:ext uri="{FF2B5EF4-FFF2-40B4-BE49-F238E27FC236}">
-                <a16:creationId xmlns="" xmlns:a16="http://schemas.microsoft.com/office/drawing/2014/main" id="{80F26E69-87D9-4655-AE7B-280A87AA3CAD}"/>
+                <a16:creationId xmlns:a16="http://schemas.microsoft.com/office/drawing/2014/main" id="{80F26E69-87D9-4655-AE7B-280A87AA3CAD}"/>
               </a:ext>
               <a:ext uri="{C183D7F6-B498-43B3-948B-1728B52AA6E4}">
-                <adec:decorative xmlns="" xmlns:adec="http://schemas.microsoft.com/office/drawing/2017/decorative" val="1"/>
+                <adec:decorative xmlns:adec="http://schemas.microsoft.com/office/drawing/2017/decorative" val="1"/>
               </a:ext>
             </a:extLst>
           </p:cNvPr>
@@ -4393,7 +4393,7 @@
           <p:nvPr>
             <p:extLst>
               <p:ext uri="{386F3935-93C4-4BCD-93E2-E3B085C9AB24}">
-                <p16:designElem xmlns="" xmlns:p16="http://schemas.microsoft.com/office/powerpoint/2015/main" val="1"/>
+                <p16:designElem xmlns:p16="http://schemas.microsoft.com/office/powerpoint/2015/main" val="1"/>
               </p:ext>
             </p:extLst>
           </p:nvPr>
@@ -4424,7 +4424,7 @@
           <p:cNvPr id="2" name="Title 1">
             <a:extLst>
               <a:ext uri="{FF2B5EF4-FFF2-40B4-BE49-F238E27FC236}">
-                <a16:creationId xmlns="" xmlns:a16="http://schemas.microsoft.com/office/drawing/2014/main" id="{18C3B467-088C-4F3D-A9A7-105C4E1E20CD}"/>
+                <a16:creationId xmlns:a16="http://schemas.microsoft.com/office/drawing/2014/main" id="{18C3B467-088C-4F3D-A9A7-105C4E1E20CD}"/>
               </a:ext>
             </a:extLst>
           </p:cNvPr>
@@ -4463,7 +4463,7 @@
           <p:cNvPr id="3" name="Subtitle 2">
             <a:extLst>
               <a:ext uri="{FF2B5EF4-FFF2-40B4-BE49-F238E27FC236}">
-                <a16:creationId xmlns="" xmlns:a16="http://schemas.microsoft.com/office/drawing/2014/main" id="{C8722DDC-8EEE-4A06-8DFE-B44871EAA2CF}"/>
+                <a16:creationId xmlns:a16="http://schemas.microsoft.com/office/drawing/2014/main" id="{C8722DDC-8EEE-4A06-8DFE-B44871EAA2CF}"/>
               </a:ext>
             </a:extLst>
           </p:cNvPr>
@@ -4548,7 +4548,7 @@
           <a:lstStyle/>
           <a:p>
             <a:r>
-              <a:rPr lang="en-GB" dirty="0" smtClean="0"/>
+              <a:rPr lang="en-GB" dirty="0"/>
               <a:t>How to access developer tools in Google Chrome…</a:t>
             </a:r>
             <a:endParaRPr lang="en-US" dirty="0"/>
@@ -4579,19 +4579,19 @@
               <a:buNone/>
             </a:pPr>
             <a:r>
-              <a:rPr lang="en-GB" sz="1600" b="1" dirty="0" err="1" smtClean="0"/>
+              <a:rPr lang="en-GB" sz="1600" b="1" dirty="0" err="1"/>
               <a:t>Ctrl+U</a:t>
             </a:r>
             <a:r>
-              <a:rPr lang="en-GB" sz="1600" dirty="0" smtClean="0"/>
+              <a:rPr lang="en-GB" sz="1600" dirty="0"/>
               <a:t> to view the HTML (as well as inline CSS/JavaScript code, </a:t>
             </a:r>
             <a:r>
-              <a:rPr lang="en-GB" sz="1600" dirty="0" err="1" smtClean="0"/>
+              <a:rPr lang="en-GB" sz="1600" dirty="0" err="1"/>
               <a:t>i.e</a:t>
             </a:r>
             <a:r>
-              <a:rPr lang="en-GB" sz="1600" dirty="0" smtClean="0"/>
+              <a:rPr lang="en-GB" sz="1600" dirty="0"/>
               <a:t>: CSS/JavaScript embedded into HTML via style/script) code.</a:t>
             </a:r>
           </a:p>
@@ -4600,25 +4600,24 @@
               <a:buNone/>
             </a:pPr>
             <a:r>
-              <a:rPr lang="en-GB" sz="1600" b="1" dirty="0" err="1" smtClean="0"/>
+              <a:rPr lang="en-GB" sz="1600" b="1" dirty="0" err="1"/>
               <a:t>Ctrl+Shift+I</a:t>
             </a:r>
             <a:r>
-              <a:rPr lang="en-GB" sz="1600" b="1" dirty="0" smtClean="0"/>
+              <a:rPr lang="en-GB" sz="1600" b="1" dirty="0"/>
               <a:t> </a:t>
             </a:r>
             <a:r>
-              <a:rPr lang="en-GB" sz="1600" dirty="0" smtClean="0"/>
+              <a:rPr lang="en-GB" sz="1600" dirty="0"/>
               <a:t>to access developer tools.</a:t>
             </a:r>
-            <a:endParaRPr lang="en-GB" sz="1600" dirty="0"/>
           </a:p>
           <a:p>
             <a:pPr marL="0" indent="0" algn="just">
               <a:buNone/>
             </a:pPr>
             <a:r>
-              <a:rPr lang="en-GB" sz="1600" dirty="0" smtClean="0"/>
+              <a:rPr lang="en-GB" sz="1600" dirty="0"/>
               <a:t>You can either using the key combinations above or navigate to said options within the context menu.</a:t>
             </a:r>
             <a:endParaRPr lang="en-US" sz="1600" dirty="0"/>
@@ -4658,13 +4657,6 @@
   <p:clrMapOvr>
     <a:masterClrMapping/>
   </p:clrMapOvr>
-  <p:timing>
-    <p:tnLst>
-      <p:par>
-        <p:cTn id="1" dur="indefinite" restart="never" nodeType="tmRoot"/>
-      </p:par>
-    </p:tnLst>
-  </p:timing>
 </p:sld>
 </file>
 
@@ -4706,7 +4698,7 @@
           <a:lstStyle/>
           <a:p>
             <a:r>
-              <a:rPr lang="en-GB" dirty="0" smtClean="0"/>
+              <a:rPr lang="en-GB" dirty="0"/>
               <a:t>Microsoft Edge</a:t>
             </a:r>
             <a:endParaRPr lang="en-US" dirty="0"/>
@@ -4734,26 +4726,31 @@
               <a:buNone/>
             </a:pPr>
             <a:r>
-              <a:rPr lang="en-GB" dirty="0" smtClean="0">
+              <a:rPr lang="en-GB" dirty="0">
                 <a:hlinkClick r:id="rId2"/>
               </a:rPr>
               <a:t>Microsoft Edge</a:t>
             </a:r>
             <a:r>
-              <a:rPr lang="en-GB" dirty="0" smtClean="0"/>
-              <a:t>, a cross-platform browser developed by Microsoft, has </a:t>
-            </a:r>
-            <a:r>
               <a:rPr lang="en-GB" dirty="0"/>
-              <a:t>recently introduced Vertical Tabs. This is advantageous when it comes to several currently open tabs. The user will thus be able to tell between tabs by means of this newly introduced feature, preventing them from accidentally closing the wrong tab. The user can easily toggle between horizontal and vertical tabs with a single </a:t>
-            </a:r>
-            <a:r>
-              <a:rPr lang="en-GB" dirty="0" smtClean="0"/>
-              <a:t>click.</a:t>
-            </a:r>
+              <a:t>, a cross-platform browser developed by Microsoft, has recently introduced Vertical Tabs. This is advantageous when it comes to several currently open tabs. The user will thus be able to tell between tabs by means of this newly introduced feature, preventing them from accidentally closing the wrong tab. The user can easily toggle between horizontal and vertical tabs with a single click. </a:t>
+            </a:r>
+          </a:p>
+          <a:p>
+            <a:pPr marL="0" indent="0" algn="just" fontAlgn="base">
+              <a:buNone/>
+            </a:pPr>
             <a:r>
               <a:rPr lang="en-GB" dirty="0"/>
-              <a:t> </a:t>
+              <a:t>As of June 2020, Microsoft Edge has become available for Windows 7, Windows 8.1 users. Unfortunately, no official version is available for Chromebooks and Linux yet as of October 2020. It was originally developed for Windows 10 back in 2015. It was then rendered compatible with Android and iOS in 2017, as well as </a:t>
+            </a:r>
+            <a:r>
+              <a:rPr lang="en-GB" dirty="0" err="1"/>
+              <a:t>macOS</a:t>
+            </a:r>
+            <a:r>
+              <a:rPr lang="en-GB" dirty="0"/>
+              <a:t> in 2019.</a:t>
             </a:r>
           </a:p>
           <a:p>
@@ -4761,75 +4758,17 @@
               <a:buNone/>
             </a:pPr>
             <a:r>
-              <a:rPr lang="en-GB" dirty="0" smtClean="0"/>
-              <a:t>As </a:t>
-            </a:r>
-            <a:r>
               <a:rPr lang="en-GB" dirty="0"/>
-              <a:t>of June 2020, Microsoft Edge has become available for Windows 7, Windows </a:t>
-            </a:r>
-            <a:r>
-              <a:rPr lang="en-GB" dirty="0" smtClean="0"/>
-              <a:t>8.1 users</a:t>
-            </a:r>
+              <a:t>Microsoft Edge, now based on Chromium and supports a plethora of Google Chrome extensions, has been re-enhanced in a way whereby pages load faster, and all the same preventing the browser from putting a load on the computer resources, mainly memory and CPU, as a result of having eliminated obsolete web technologies.</a:t>
+            </a:r>
+          </a:p>
+          <a:p>
+            <a:pPr marL="0" indent="0" algn="just" fontAlgn="base">
+              <a:buNone/>
+            </a:pPr>
             <a:r>
               <a:rPr lang="en-GB" dirty="0"/>
-              <a:t>. Unfortunately, no official version is available for Chromebooks and Linux </a:t>
-            </a:r>
-            <a:r>
-              <a:rPr lang="en-GB" dirty="0" smtClean="0"/>
-              <a:t>yet as of October 2020.</a:t>
-            </a:r>
-            <a:r>
-              <a:rPr lang="en-GB" dirty="0"/>
-              <a:t> </a:t>
-            </a:r>
-            <a:r>
-              <a:rPr lang="en-GB" dirty="0" smtClean="0"/>
-              <a:t>It was originally developed for Windows 10 back in 2015. It was then rendered compatible with Android and iOS in 2017, as well as </a:t>
-            </a:r>
-            <a:r>
-              <a:rPr lang="en-GB" dirty="0" err="1" smtClean="0"/>
-              <a:t>macOS</a:t>
-            </a:r>
-            <a:r>
-              <a:rPr lang="en-GB" dirty="0" smtClean="0"/>
-              <a:t> in 2019.</a:t>
-            </a:r>
-          </a:p>
-          <a:p>
-            <a:pPr marL="0" indent="0" algn="just" fontAlgn="base">
-              <a:buNone/>
-            </a:pPr>
-            <a:r>
-              <a:rPr lang="en-GB" dirty="0" smtClean="0"/>
-              <a:t>Microsoft Edge, now based on Chromium and supports a plethora of Google Chrome extensions, </a:t>
-            </a:r>
-            <a:r>
-              <a:rPr lang="en-GB" dirty="0"/>
-              <a:t>has been re-enhanced in a way whereby pages load faster, and all the same preventing the browser from putting a load on the computer resources, mainly memory and CPU, as a result of having eliminated obsolete web </a:t>
-            </a:r>
-            <a:r>
-              <a:rPr lang="en-GB" dirty="0" smtClean="0"/>
-              <a:t>technologies.</a:t>
-            </a:r>
-            <a:endParaRPr lang="en-GB" dirty="0"/>
-          </a:p>
-          <a:p>
-            <a:pPr marL="0" indent="0" algn="just" fontAlgn="base">
-              <a:buNone/>
-            </a:pPr>
-            <a:r>
-              <a:rPr lang="en-GB" dirty="0" smtClean="0"/>
-              <a:t>With </a:t>
-            </a:r>
-            <a:r>
-              <a:rPr lang="en-GB" dirty="0"/>
-              <a:t>the click of a button, one can also utilize the distraction-free reading method known as Immersive Reader. All advertisements and any element considered a distraction will be removed</a:t>
-            </a:r>
-            <a:r>
-              <a:rPr lang="en-GB" dirty="0" smtClean="0"/>
-              <a:t>.</a:t>
+              <a:t>With the click of a button, one can also utilize the distraction-free reading method known as Immersive Reader. All advertisements and any element considered a distraction will be removed.</a:t>
             </a:r>
             <a:endParaRPr lang="en-US" dirty="0"/>
           </a:p>
@@ -4886,13 +4825,6 @@
   <p:clrMapOvr>
     <a:masterClrMapping/>
   </p:clrMapOvr>
-  <p:timing>
-    <p:tnLst>
-      <p:par>
-        <p:cTn id="1" dur="indefinite" restart="never" nodeType="tmRoot"/>
-      </p:par>
-    </p:tnLst>
-  </p:timing>
 </p:sld>
 </file>
 
@@ -4929,7 +4861,7 @@
           <a:lstStyle/>
           <a:p>
             <a:r>
-              <a:rPr lang="en-GB" dirty="0" smtClean="0"/>
+              <a:rPr lang="en-GB" dirty="0"/>
               <a:t>How to access developer tools in Microsoft Edge…</a:t>
             </a:r>
             <a:endParaRPr lang="en-US" dirty="0"/>
@@ -4985,19 +4917,19 @@
               <a:buNone/>
             </a:pPr>
             <a:r>
-              <a:rPr lang="en-GB" sz="1600" b="1" dirty="0" err="1" smtClean="0"/>
+              <a:rPr lang="en-GB" sz="1600" b="1" dirty="0" err="1"/>
               <a:t>Ctrl+U</a:t>
             </a:r>
             <a:r>
-              <a:rPr lang="en-GB" sz="1600" dirty="0" smtClean="0"/>
+              <a:rPr lang="en-GB" sz="1600" dirty="0"/>
               <a:t> to view the HTML (as well as inline CSS/JavaScript code, </a:t>
             </a:r>
             <a:r>
-              <a:rPr lang="en-GB" sz="1600" dirty="0" err="1" smtClean="0"/>
+              <a:rPr lang="en-GB" sz="1600" dirty="0" err="1"/>
               <a:t>i.e</a:t>
             </a:r>
             <a:r>
-              <a:rPr lang="en-GB" sz="1600" dirty="0" smtClean="0"/>
+              <a:rPr lang="en-GB" sz="1600" dirty="0"/>
               <a:t>: CSS/JavaScript embedded into HTML via style/script) code.</a:t>
             </a:r>
           </a:p>
@@ -5006,25 +4938,24 @@
               <a:buNone/>
             </a:pPr>
             <a:r>
-              <a:rPr lang="en-GB" sz="1600" b="1" dirty="0" err="1" smtClean="0"/>
+              <a:rPr lang="en-GB" sz="1600" b="1" dirty="0" err="1"/>
               <a:t>Ctrl+Shift+I</a:t>
             </a:r>
             <a:r>
-              <a:rPr lang="en-GB" sz="1600" b="1" dirty="0" smtClean="0"/>
+              <a:rPr lang="en-GB" sz="1600" b="1" dirty="0"/>
               <a:t> </a:t>
             </a:r>
             <a:r>
-              <a:rPr lang="en-GB" sz="1600" dirty="0" smtClean="0"/>
+              <a:rPr lang="en-GB" sz="1600" dirty="0"/>
               <a:t>to access developer tools.</a:t>
             </a:r>
-            <a:endParaRPr lang="en-GB" sz="1600" dirty="0"/>
           </a:p>
           <a:p>
             <a:pPr marL="0" indent="0" algn="just">
               <a:buNone/>
             </a:pPr>
             <a:r>
-              <a:rPr lang="en-GB" sz="1600" dirty="0" smtClean="0"/>
+              <a:rPr lang="en-GB" sz="1600" dirty="0"/>
               <a:t>You can either using the key combinations above or navigate to said options within the context menu.</a:t>
             </a:r>
             <a:endParaRPr lang="en-US" sz="1600" dirty="0"/>
@@ -5041,13 +4972,6 @@
   <p:clrMapOvr>
     <a:masterClrMapping/>
   </p:clrMapOvr>
-  <p:timing>
-    <p:tnLst>
-      <p:par>
-        <p:cTn id="1" dur="indefinite" restart="never" nodeType="tmRoot"/>
-      </p:par>
-    </p:tnLst>
-  </p:timing>
 </p:sld>
 </file>
 
@@ -5089,7 +5013,7 @@
           <a:lstStyle/>
           <a:p>
             <a:r>
-              <a:rPr lang="en-GB" dirty="0" smtClean="0"/>
+              <a:rPr lang="en-GB" dirty="0"/>
               <a:t>Opera</a:t>
             </a:r>
             <a:endParaRPr lang="en-US" dirty="0"/>
@@ -5124,46 +5048,17 @@
             </a:r>
             <a:r>
               <a:rPr lang="en-GB" dirty="0"/>
-              <a:t>’s ad-blocker allows faster browsing activity by 90% as the browser is loaded without any </a:t>
-            </a:r>
-            <a:r>
-              <a:rPr lang="en-GB" dirty="0" smtClean="0"/>
-              <a:t>advertisements, without the use of add-ons.</a:t>
-            </a:r>
+              <a:t>’s ad-blocker allows faster browsing activity by 90% as the browser is loaded without any advertisements, without the use of add-ons. This feature was initially available for the developer counterpart but was subsequently implemented on stable versions of Opera. </a:t>
+            </a:r>
+          </a:p>
+          <a:p>
+            <a:pPr marL="0" indent="0" algn="just" fontAlgn="base">
+              <a:buNone/>
+            </a:pPr>
             <a:r>
               <a:rPr lang="en-GB" dirty="0"/>
-              <a:t> This feature was initially available for the developer counterpart but was subsequently implemented on stable versions of </a:t>
-            </a:r>
-            <a:r>
-              <a:rPr lang="en-GB" dirty="0" smtClean="0"/>
-              <a:t>Opera. </a:t>
-            </a:r>
-          </a:p>
-          <a:p>
-            <a:pPr marL="0" indent="0" algn="just" fontAlgn="base">
-              <a:buNone/>
-            </a:pPr>
-            <a:r>
-              <a:rPr lang="en-GB" dirty="0" smtClean="0"/>
-              <a:t>Opera </a:t>
-            </a:r>
-            <a:r>
-              <a:rPr lang="en-GB" dirty="0"/>
-              <a:t>is also ideal to be run on poor wireless connections as Opera Turbo allows up to 15% faster browsing activity. </a:t>
-            </a:r>
-            <a:r>
-              <a:rPr lang="en-GB" dirty="0" smtClean="0"/>
-              <a:t>The </a:t>
-            </a:r>
-            <a:r>
-              <a:rPr lang="en-GB" dirty="0"/>
-              <a:t>browser also comes with a free and unlimited VPN, as well as power saving features to help prolong battery life</a:t>
-            </a:r>
-            <a:r>
-              <a:rPr lang="en-GB" dirty="0" smtClean="0"/>
-              <a:t>.</a:t>
-            </a:r>
-            <a:endParaRPr lang="en-GB" dirty="0"/>
+              <a:t>Opera is also ideal to be run on poor wireless connections as Opera Turbo allows up to 15% faster browsing activity. The browser also comes with a free and unlimited VPN, as well as power saving features to help prolong battery life.</a:t>
+            </a:r>
           </a:p>
         </p:txBody>
       </p:sp>
@@ -5218,13 +5113,6 @@
   <p:clrMapOvr>
     <a:masterClrMapping/>
   </p:clrMapOvr>
-  <p:timing>
-    <p:tnLst>
-      <p:par>
-        <p:cTn id="1" dur="indefinite" restart="never" nodeType="tmRoot"/>
-      </p:par>
-    </p:tnLst>
-  </p:timing>
 </p:sld>
 </file>
 
@@ -5261,7 +5149,7 @@
           <a:lstStyle/>
           <a:p>
             <a:r>
-              <a:rPr lang="en-GB" dirty="0" smtClean="0"/>
+              <a:rPr lang="en-GB" dirty="0"/>
               <a:t>How to access developer tools in Opera…</a:t>
             </a:r>
             <a:endParaRPr lang="en-US" dirty="0"/>
@@ -5292,19 +5180,19 @@
               <a:buNone/>
             </a:pPr>
             <a:r>
-              <a:rPr lang="en-GB" sz="1600" b="1" dirty="0" err="1" smtClean="0"/>
+              <a:rPr lang="en-GB" sz="1600" b="1" dirty="0" err="1"/>
               <a:t>Ctrl+U</a:t>
             </a:r>
             <a:r>
-              <a:rPr lang="en-GB" sz="1600" dirty="0" smtClean="0"/>
+              <a:rPr lang="en-GB" sz="1600" dirty="0"/>
               <a:t> to view the HTML (as well as inline CSS/JavaScript code, </a:t>
             </a:r>
             <a:r>
-              <a:rPr lang="en-GB" sz="1600" dirty="0" err="1" smtClean="0"/>
+              <a:rPr lang="en-GB" sz="1600" dirty="0" err="1"/>
               <a:t>i.e</a:t>
             </a:r>
             <a:r>
-              <a:rPr lang="en-GB" sz="1600" dirty="0" smtClean="0"/>
+              <a:rPr lang="en-GB" sz="1600" dirty="0"/>
               <a:t>: CSS/JavaScript embedded into HTML via style/script) code.</a:t>
             </a:r>
           </a:p>
@@ -5313,25 +5201,24 @@
               <a:buNone/>
             </a:pPr>
             <a:r>
-              <a:rPr lang="en-GB" sz="1600" b="1" dirty="0" err="1" smtClean="0"/>
+              <a:rPr lang="en-GB" sz="1600" b="1" dirty="0" err="1"/>
               <a:t>Ctrl+Shift+C</a:t>
             </a:r>
             <a:r>
-              <a:rPr lang="en-GB" sz="1600" b="1" dirty="0" smtClean="0"/>
+              <a:rPr lang="en-GB" sz="1600" b="1" dirty="0"/>
               <a:t> </a:t>
             </a:r>
             <a:r>
-              <a:rPr lang="en-GB" sz="1600" dirty="0" smtClean="0"/>
+              <a:rPr lang="en-GB" sz="1600" dirty="0"/>
               <a:t>to access developer tools.</a:t>
             </a:r>
-            <a:endParaRPr lang="en-GB" sz="1600" dirty="0"/>
           </a:p>
           <a:p>
             <a:pPr marL="0" indent="0" algn="just">
               <a:buNone/>
             </a:pPr>
             <a:r>
-              <a:rPr lang="en-GB" sz="1600" dirty="0" smtClean="0"/>
+              <a:rPr lang="en-GB" sz="1600" dirty="0"/>
               <a:t>You can either using the key combinations above or navigate to said options within the context menu.</a:t>
             </a:r>
             <a:endParaRPr lang="en-US" sz="1600" dirty="0"/>
@@ -5371,13 +5258,6 @@
   <p:clrMapOvr>
     <a:masterClrMapping/>
   </p:clrMapOvr>
-  <p:timing>
-    <p:tnLst>
-      <p:par>
-        <p:cTn id="1" dur="indefinite" restart="never" nodeType="tmRoot"/>
-      </p:par>
-    </p:tnLst>
-  </p:timing>
 </p:sld>
 </file>
 
@@ -5414,7 +5294,7 @@
           <a:lstStyle/>
           <a:p>
             <a:r>
-              <a:rPr lang="en-GB" dirty="0" smtClean="0"/>
+              <a:rPr lang="en-GB" dirty="0"/>
               <a:t>Viewing source code</a:t>
             </a:r>
             <a:endParaRPr lang="en-US" dirty="0"/>
@@ -5456,13 +5336,6 @@
   <p:clrMapOvr>
     <a:masterClrMapping/>
   </p:clrMapOvr>
-  <p:timing>
-    <p:tnLst>
-      <p:par>
-        <p:cTn id="1" dur="indefinite" restart="never" nodeType="tmRoot"/>
-      </p:par>
-    </p:tnLst>
-  </p:timing>
 </p:sld>
 </file>
 
@@ -5499,7 +5372,7 @@
           <a:lstStyle/>
           <a:p>
             <a:r>
-              <a:rPr lang="en-GB" dirty="0" smtClean="0"/>
+              <a:rPr lang="en-GB" dirty="0"/>
               <a:t>What do you need for this unit?</a:t>
             </a:r>
             <a:endParaRPr lang="en-US" dirty="0"/>
@@ -5524,109 +5397,61 @@
           <a:lstStyle/>
           <a:p>
             <a:r>
-              <a:rPr lang="en-GB" dirty="0" smtClean="0"/>
+              <a:rPr lang="en-GB" dirty="0"/>
               <a:t>Text editor to produce and maintain HTML, CSS and JavaScript code.</a:t>
             </a:r>
           </a:p>
           <a:p>
             <a:pPr lvl="1"/>
             <a:r>
-              <a:rPr lang="en-GB" dirty="0" smtClean="0">
+              <a:rPr lang="en-GB" dirty="0">
                 <a:hlinkClick r:id="rId2"/>
               </a:rPr>
               <a:t>Visual Studio Code</a:t>
             </a:r>
-            <a:endParaRPr lang="en-GB" dirty="0" smtClean="0"/>
+            <a:endParaRPr lang="en-GB" dirty="0"/>
           </a:p>
           <a:p>
             <a:pPr lvl="1"/>
             <a:r>
-              <a:rPr lang="en-GB" dirty="0" smtClean="0">
+              <a:rPr lang="en-GB" dirty="0">
                 <a:hlinkClick r:id="rId3"/>
               </a:rPr>
               <a:t>Brackets</a:t>
             </a:r>
-            <a:endParaRPr lang="en-GB" dirty="0" smtClean="0"/>
+            <a:endParaRPr lang="en-GB" dirty="0"/>
           </a:p>
           <a:p>
             <a:pPr lvl="1"/>
             <a:r>
-              <a:rPr lang="en-GB" dirty="0" smtClean="0">
+              <a:rPr lang="en-GB" dirty="0">
                 <a:hlinkClick r:id="rId4"/>
               </a:rPr>
               <a:t>Atom</a:t>
             </a:r>
-            <a:endParaRPr lang="en-GB" dirty="0" smtClean="0"/>
+            <a:endParaRPr lang="en-GB" dirty="0"/>
           </a:p>
           <a:p>
             <a:pPr lvl="1"/>
             <a:r>
-              <a:rPr lang="en-GB" dirty="0" smtClean="0">
+              <a:rPr lang="en-GB" dirty="0">
                 <a:hlinkClick r:id="rId5"/>
               </a:rPr>
               <a:t>Sublime Text</a:t>
             </a:r>
-            <a:endParaRPr lang="en-GB" dirty="0" smtClean="0"/>
+            <a:endParaRPr lang="en-GB" dirty="0"/>
           </a:p>
           <a:p>
             <a:pPr marL="274320" lvl="1" indent="0" algn="just">
               <a:buNone/>
             </a:pPr>
-            <a:r>
-              <a:rPr lang="en-GB" b="1" dirty="0" smtClean="0">
-                <a:solidFill>
-                  <a:srgbClr val="FF0000"/>
-                </a:solidFill>
-              </a:rPr>
-              <a:t>I would not recommend Notepad and Notepad++ as it can be rather frustrating for beginners. </a:t>
-            </a:r>
             <a:r>
               <a:rPr lang="en-GB" b="1" dirty="0">
                 <a:solidFill>
                   <a:srgbClr val="FF0000"/>
                 </a:solidFill>
               </a:rPr>
-              <a:t>I would highly suggest Visual Studio Code due to its built-in </a:t>
-            </a:r>
-            <a:r>
-              <a:rPr lang="en-GB" b="1" dirty="0" smtClean="0">
-                <a:solidFill>
-                  <a:srgbClr val="FF0000"/>
-                </a:solidFill>
-              </a:rPr>
-              <a:t>auto-save functionality, as well as automatic code suggestion, </a:t>
-            </a:r>
-            <a:r>
-              <a:rPr lang="en-GB" b="1" dirty="0">
-                <a:solidFill>
-                  <a:srgbClr val="FF0000"/>
-                </a:solidFill>
-              </a:rPr>
-              <a:t>moreover there is a Live Server extension which works hand in hand with </a:t>
-            </a:r>
-            <a:r>
-              <a:rPr lang="en-GB" b="1" dirty="0" smtClean="0">
-                <a:solidFill>
-                  <a:srgbClr val="FF0000"/>
-                </a:solidFill>
-              </a:rPr>
-              <a:t>auto-save </a:t>
-            </a:r>
-            <a:r>
-              <a:rPr lang="en-GB" b="1" dirty="0">
-                <a:solidFill>
-                  <a:srgbClr val="FF0000"/>
-                </a:solidFill>
-              </a:rPr>
-              <a:t>and changes are synchronized for every </a:t>
-            </a:r>
-            <a:r>
-              <a:rPr lang="en-GB" b="1" dirty="0" smtClean="0">
-                <a:solidFill>
-                  <a:srgbClr val="FF0000"/>
-                </a:solidFill>
-              </a:rPr>
-              <a:t>save.</a:t>
+              <a:t>I would not recommend Notepad and Notepad++ as it can be rather frustrating for beginners. I would highly suggest Visual Studio Code due to its built-in auto-save functionality, as well as automatic code suggestion, moreover there is a Live Server extension which works hand in hand with auto-save and changes are synchronized for every save.</a:t>
             </a:r>
           </a:p>
           <a:p>
@@ -5639,57 +5464,21 @@
               </a:spcBef>
             </a:pPr>
             <a:r>
-              <a:rPr lang="en-GB" sz="1500" dirty="0" smtClean="0"/>
-              <a:t>A </a:t>
-            </a:r>
-            <a:r>
               <a:rPr lang="en-GB" sz="1500" dirty="0"/>
-              <a:t>web browser to view changes. </a:t>
+              <a:t>A web browser to view changes. </a:t>
             </a:r>
           </a:p>
           <a:p>
             <a:pPr marL="274320" lvl="1" indent="0" algn="just">
               <a:buNone/>
             </a:pPr>
-            <a:r>
-              <a:rPr lang="en-GB" b="1" dirty="0" smtClean="0">
-                <a:solidFill>
-                  <a:srgbClr val="FF0000"/>
-                </a:solidFill>
-              </a:rPr>
-              <a:t>Again</a:t>
-            </a:r>
             <a:r>
               <a:rPr lang="en-GB" b="1" dirty="0">
                 <a:solidFill>
                   <a:srgbClr val="FF0000"/>
                 </a:solidFill>
               </a:rPr>
-              <a:t>, you can use any web browser of your choice but I strongly suggest Microsoft Edge. It is based on Google Chrome's lightweight </a:t>
-            </a:r>
-            <a:r>
-              <a:rPr lang="en-GB" b="1" dirty="0" smtClean="0">
-                <a:solidFill>
-                  <a:srgbClr val="FF0000"/>
-                </a:solidFill>
-              </a:rPr>
-              <a:t>and open-source counterpart</a:t>
-            </a:r>
-            <a:r>
-              <a:rPr lang="en-GB" b="1" dirty="0">
-                <a:solidFill>
-                  <a:srgbClr val="FF0000"/>
-                </a:solidFill>
-              </a:rPr>
-              <a:t>, Chromium. It has website development tools, such as testing how your website would look like on certain devices such as iPhone X, iPad Pro, etc. Custom screen resolutions can also be taken into consideration</a:t>
-            </a:r>
-            <a:r>
-              <a:rPr lang="en-GB" b="1" dirty="0" smtClean="0">
-                <a:solidFill>
-                  <a:srgbClr val="FF0000"/>
-                </a:solidFill>
-              </a:rPr>
-              <a:t>.</a:t>
+              <a:t>Again, you can use any web browser of your choice but I strongly suggest Microsoft Edge. It is based on Google Chrome's lightweight and open-source counterpart, Chromium. It has website development tools, such as testing how your website would look like on certain devices such as iPhone X, iPad Pro, etc. Custom screen resolutions can also be taken into consideration.</a:t>
             </a:r>
           </a:p>
           <a:p>
@@ -5699,7 +5488,7 @@
               </a:lnSpc>
               <a:buNone/>
             </a:pPr>
-            <a:endParaRPr lang="en-GB" b="1" dirty="0" smtClean="0">
+            <a:endParaRPr lang="en-GB" b="1" dirty="0">
               <a:solidFill>
                 <a:srgbClr val="FF0000"/>
               </a:solidFill>
@@ -5710,16 +5499,8 @@
               <a:buNone/>
             </a:pPr>
             <a:r>
-              <a:rPr lang="en-GB" dirty="0" smtClean="0"/>
-              <a:t>Kindly note that all the text editors above, with the exception of Sublime </a:t>
-            </a:r>
-            <a:r>
               <a:rPr lang="en-GB" dirty="0"/>
-              <a:t>T</a:t>
-            </a:r>
-            <a:r>
-              <a:rPr lang="en-GB" dirty="0" smtClean="0"/>
-              <a:t>ext, require Windows 7 or later.</a:t>
+              <a:t>Kindly note that all the text editors above, with the exception of Sublime Text, require Windows 7 or later.</a:t>
             </a:r>
             <a:endParaRPr lang="en-US" dirty="0"/>
           </a:p>
@@ -5776,13 +5557,6 @@
   <p:clrMapOvr>
     <a:masterClrMapping/>
   </p:clrMapOvr>
-  <p:timing>
-    <p:tnLst>
-      <p:par>
-        <p:cTn id="1" dur="indefinite" restart="never" nodeType="tmRoot"/>
-      </p:par>
-    </p:tnLst>
-  </p:timing>
 </p:sld>
 </file>
 
@@ -5819,7 +5593,7 @@
           <a:lstStyle/>
           <a:p>
             <a:r>
-              <a:rPr lang="en-GB" dirty="0" smtClean="0"/>
+              <a:rPr lang="en-GB" dirty="0"/>
               <a:t>Nota bene</a:t>
             </a:r>
             <a:endParaRPr lang="en-US" dirty="0"/>
@@ -5842,25 +5616,25 @@
           <a:lstStyle/>
           <a:p>
             <a:r>
-              <a:rPr lang="en-GB" dirty="0" smtClean="0"/>
+              <a:rPr lang="en-GB" dirty="0"/>
               <a:t>Previous knowledge of HTML, CSS and JavaScript is </a:t>
             </a:r>
             <a:r>
-              <a:rPr lang="en-GB" sz="1800" b="1" dirty="0" smtClean="0"/>
+              <a:rPr lang="en-GB" sz="1800" b="1" dirty="0"/>
               <a:t>NOT</a:t>
             </a:r>
             <a:r>
-              <a:rPr lang="en-GB" dirty="0" smtClean="0"/>
+              <a:rPr lang="en-GB" dirty="0"/>
               <a:t> a prerequisite as I intend to start from the most rudimentary concepts possible.</a:t>
             </a:r>
           </a:p>
           <a:p>
             <a:r>
-              <a:rPr lang="en-GB" dirty="0" smtClean="0"/>
+              <a:rPr lang="en-GB" dirty="0"/>
               <a:t>The key to mastering website development is practice and maintaining a positive attitude! </a:t>
             </a:r>
             <a:r>
-              <a:rPr lang="en-GB" dirty="0" smtClean="0">
+              <a:rPr lang="en-GB" dirty="0">
                 <a:sym typeface="Wingdings" panose="05000000000000000000" pitchFamily="2" charset="2"/>
               </a:rPr>
               <a:t></a:t>
@@ -5868,32 +5642,32 @@
           </a:p>
           <a:p>
             <a:r>
-              <a:rPr lang="en-GB" dirty="0" smtClean="0">
+              <a:rPr lang="en-GB" dirty="0">
                 <a:sym typeface="Wingdings" panose="05000000000000000000" pitchFamily="2" charset="2"/>
               </a:rPr>
               <a:t>Examples will be available on </a:t>
             </a:r>
             <a:r>
-              <a:rPr lang="en-GB" dirty="0" smtClean="0">
+              <a:rPr lang="en-GB" dirty="0">
                 <a:sym typeface="Wingdings" panose="05000000000000000000" pitchFamily="2" charset="2"/>
                 <a:hlinkClick r:id="rId2"/>
               </a:rPr>
               <a:t>GitHub</a:t>
             </a:r>
             <a:r>
-              <a:rPr lang="en-GB" dirty="0" smtClean="0">
+              <a:rPr lang="en-GB" dirty="0">
                 <a:sym typeface="Wingdings" panose="05000000000000000000" pitchFamily="2" charset="2"/>
               </a:rPr>
               <a:t> for future reference. You are </a:t>
             </a:r>
             <a:r>
-              <a:rPr lang="en-GB" sz="1800" b="1" dirty="0" smtClean="0">
+              <a:rPr lang="en-GB" sz="1800" b="1" dirty="0">
                 <a:sym typeface="Wingdings" panose="05000000000000000000" pitchFamily="2" charset="2"/>
               </a:rPr>
               <a:t>NOT</a:t>
             </a:r>
             <a:r>
-              <a:rPr lang="en-GB" dirty="0" smtClean="0">
+              <a:rPr lang="en-GB" dirty="0">
                 <a:sym typeface="Wingdings" panose="05000000000000000000" pitchFamily="2" charset="2"/>
               </a:rPr>
               <a:t> required to use GitHub.</a:t>
@@ -5901,7 +5675,7 @@
           </a:p>
           <a:p>
             <a:r>
-              <a:rPr lang="en-GB" dirty="0" smtClean="0">
+              <a:rPr lang="en-GB" dirty="0">
                 <a:sym typeface="Wingdings" panose="05000000000000000000" pitchFamily="2" charset="2"/>
               </a:rPr>
               <a:t>Do not be discouraged by errors! There is no standard learning curve, everyone learns at their own pace.</a:t>
@@ -5909,20 +5683,20 @@
           </a:p>
           <a:p>
             <a:r>
-              <a:rPr lang="en-GB" dirty="0" smtClean="0">
+              <a:rPr lang="en-GB" dirty="0">
                 <a:sym typeface="Wingdings" panose="05000000000000000000" pitchFamily="2" charset="2"/>
               </a:rPr>
               <a:t>Sessions will be recorded and will be available via </a:t>
             </a:r>
             <a:r>
-              <a:rPr lang="en-GB" dirty="0" smtClean="0">
+              <a:rPr lang="en-GB" dirty="0">
                 <a:sym typeface="Wingdings" panose="05000000000000000000" pitchFamily="2" charset="2"/>
                 <a:hlinkClick r:id="rId3"/>
               </a:rPr>
               <a:t>Client Side Scripting (2021) channel </a:t>
             </a:r>
             <a:r>
-              <a:rPr lang="en-GB" dirty="0" smtClean="0">
+              <a:rPr lang="en-GB" dirty="0">
                 <a:sym typeface="Wingdings" panose="05000000000000000000" pitchFamily="2" charset="2"/>
               </a:rPr>
               <a:t>in Microsoft Teams.</a:t>
@@ -5938,7 +5712,7 @@
               <a:buNone/>
             </a:pPr>
             <a:r>
-              <a:rPr lang="en-GB" sz="1400" dirty="0" smtClean="0">
+              <a:rPr lang="en-GB" sz="1400" dirty="0">
                 <a:sym typeface="Wingdings" panose="05000000000000000000" pitchFamily="2" charset="2"/>
               </a:rPr>
               <a:t>“Many of life’s failures are people who did not realize how close they were to success when they gave up. “</a:t>
@@ -5949,7 +5723,7 @@
               <a:buNone/>
             </a:pPr>
             <a:r>
-              <a:rPr lang="en-GB" sz="1400" dirty="0" smtClean="0">
+              <a:rPr lang="en-GB" sz="1400" dirty="0">
                 <a:sym typeface="Wingdings" panose="05000000000000000000" pitchFamily="2" charset="2"/>
               </a:rPr>
               <a:t>“The greatest pity in life is giving up on achieving something you want without even trying.”</a:t>
@@ -5960,7 +5734,7 @@
               <a:buNone/>
             </a:pPr>
             <a:r>
-              <a:rPr lang="en-GB" sz="1400" dirty="0" smtClean="0">
+              <a:rPr lang="en-GB" sz="1400" dirty="0">
                 <a:sym typeface="Wingdings" panose="05000000000000000000" pitchFamily="2" charset="2"/>
               </a:rPr>
               <a:t>“Success is giving your all, the will to overcome any obstacle in life to achieve what you desire.”</a:t>
@@ -6144,7 +5918,7 @@
           <p:cNvPr id="2" name="Title 1">
             <a:extLst>
               <a:ext uri="{FF2B5EF4-FFF2-40B4-BE49-F238E27FC236}">
-                <a16:creationId xmlns="" xmlns:a16="http://schemas.microsoft.com/office/drawing/2014/main" id="{A7EA2130-8C50-451E-AD98-86D9CCC6CDE5}"/>
+                <a16:creationId xmlns:a16="http://schemas.microsoft.com/office/drawing/2014/main" id="{A7EA2130-8C50-451E-AD98-86D9CCC6CDE5}"/>
               </a:ext>
             </a:extLst>
           </p:cNvPr>
@@ -6173,7 +5947,7 @@
           <p:cNvPr id="3" name="Content Placeholder 2">
             <a:extLst>
               <a:ext uri="{FF2B5EF4-FFF2-40B4-BE49-F238E27FC236}">
-                <a16:creationId xmlns="" xmlns:a16="http://schemas.microsoft.com/office/drawing/2014/main" id="{259EA294-3165-4296-86D0-CE3F628B30BC}"/>
+                <a16:creationId xmlns:a16="http://schemas.microsoft.com/office/drawing/2014/main" id="{259EA294-3165-4296-86D0-CE3F628B30BC}"/>
               </a:ext>
             </a:extLst>
           </p:cNvPr>
@@ -6205,7 +5979,7 @@
           <p:cNvPr id="4098" name="Picture 2" descr="Web Development – BR Marketing Agency">
             <a:extLst>
               <a:ext uri="{FF2B5EF4-FFF2-40B4-BE49-F238E27FC236}">
-                <a16:creationId xmlns="" xmlns:a16="http://schemas.microsoft.com/office/drawing/2014/main" id="{06A7DE03-A3F8-4E2D-8844-359BBCC88E26}"/>
+                <a16:creationId xmlns:a16="http://schemas.microsoft.com/office/drawing/2014/main" id="{06A7DE03-A3F8-4E2D-8844-359BBCC88E26}"/>
               </a:ext>
             </a:extLst>
           </p:cNvPr>
@@ -6252,7 +6026,7 @@
           <p:cNvPr id="4100" name="Picture 4">
             <a:extLst>
               <a:ext uri="{FF2B5EF4-FFF2-40B4-BE49-F238E27FC236}">
-                <a16:creationId xmlns="" xmlns:a16="http://schemas.microsoft.com/office/drawing/2014/main" id="{FA7787B2-1E09-495D-9B32-5F11E7C8444C}"/>
+                <a16:creationId xmlns:a16="http://schemas.microsoft.com/office/drawing/2014/main" id="{FA7787B2-1E09-495D-9B32-5F11E7C8444C}"/>
               </a:ext>
             </a:extLst>
           </p:cNvPr>
@@ -6299,7 +6073,7 @@
           <p:cNvPr id="4102" name="Picture 6" descr="Download LAUGHiNG EMOJi Free PNG transparent image and clipart">
             <a:extLst>
               <a:ext uri="{FF2B5EF4-FFF2-40B4-BE49-F238E27FC236}">
-                <a16:creationId xmlns="" xmlns:a16="http://schemas.microsoft.com/office/drawing/2014/main" id="{D96E4A16-B244-4C77-8CDF-BA0EB168B924}"/>
+                <a16:creationId xmlns:a16="http://schemas.microsoft.com/office/drawing/2014/main" id="{D96E4A16-B244-4C77-8CDF-BA0EB168B924}"/>
               </a:ext>
             </a:extLst>
           </p:cNvPr>
@@ -6384,7 +6158,7 @@
           <p:cNvPr id="2" name="Title 1">
             <a:extLst>
               <a:ext uri="{FF2B5EF4-FFF2-40B4-BE49-F238E27FC236}">
-                <a16:creationId xmlns="" xmlns:a16="http://schemas.microsoft.com/office/drawing/2014/main" id="{7A4919D0-F177-4BBA-9A0B-DBA69E2ED764}"/>
+                <a16:creationId xmlns:a16="http://schemas.microsoft.com/office/drawing/2014/main" id="{7A4919D0-F177-4BBA-9A0B-DBA69E2ED764}"/>
               </a:ext>
             </a:extLst>
           </p:cNvPr>
@@ -6420,7 +6194,7 @@
           <p:cNvPr id="1028" name="Picture 4" descr="C Programming Icon - Free Download, PNG and Vector">
             <a:extLst>
               <a:ext uri="{FF2B5EF4-FFF2-40B4-BE49-F238E27FC236}">
-                <a16:creationId xmlns="" xmlns:a16="http://schemas.microsoft.com/office/drawing/2014/main" id="{F42FB096-928E-4EBD-9C66-8ADE97C8E707}"/>
+                <a16:creationId xmlns:a16="http://schemas.microsoft.com/office/drawing/2014/main" id="{F42FB096-928E-4EBD-9C66-8ADE97C8E707}"/>
               </a:ext>
             </a:extLst>
           </p:cNvPr>
@@ -6467,7 +6241,7 @@
           <p:cNvPr id="1030" name="Picture 6" descr="MCAST – The Malta College of Arts, Science &amp; Technology">
             <a:extLst>
               <a:ext uri="{FF2B5EF4-FFF2-40B4-BE49-F238E27FC236}">
-                <a16:creationId xmlns="" xmlns:a16="http://schemas.microsoft.com/office/drawing/2014/main" id="{73FA3B68-8505-4659-BFAB-89D914506E25}"/>
+                <a16:creationId xmlns:a16="http://schemas.microsoft.com/office/drawing/2014/main" id="{73FA3B68-8505-4659-BFAB-89D914506E25}"/>
               </a:ext>
             </a:extLst>
           </p:cNvPr>
@@ -6514,7 +6288,7 @@
           <p:cNvPr id="7" name="TextBox 6">
             <a:extLst>
               <a:ext uri="{FF2B5EF4-FFF2-40B4-BE49-F238E27FC236}">
-                <a16:creationId xmlns="" xmlns:a16="http://schemas.microsoft.com/office/drawing/2014/main" id="{59637C6C-7474-436F-A8DC-2F7B578BADB8}"/>
+                <a16:creationId xmlns:a16="http://schemas.microsoft.com/office/drawing/2014/main" id="{59637C6C-7474-436F-A8DC-2F7B578BADB8}"/>
               </a:ext>
             </a:extLst>
           </p:cNvPr>
@@ -6540,11 +6314,7 @@
             <a:pPr algn="ctr"/>
             <a:r>
               <a:rPr lang="en-GB" dirty="0"/>
-              <a:t>I acquired the Diploma in IT (MQF Level 3) in February 2019 where I familiarized myself with website design and development and C# (mainly Windows Forms and Console .NET Framework). I am currently following my second and last year of the Advanced Diploma in IT (Software Development</a:t>
-            </a:r>
-            <a:r>
-              <a:rPr lang="en-GB" dirty="0" smtClean="0"/>
-              <a:t>).</a:t>
+              <a:t>I acquired the Diploma in IT (MQF Level 3) in February 2019 where I familiarized myself with website design and development and C# (mainly Windows Forms and Console .NET Framework). I am currently following my second and last year of the Advanced Diploma in IT (Software Development).</a:t>
             </a:r>
             <a:endParaRPr lang="en-MT" dirty="0"/>
           </a:p>
@@ -6555,7 +6325,7 @@
           <p:cNvPr id="11" name="TextBox 10">
             <a:extLst>
               <a:ext uri="{FF2B5EF4-FFF2-40B4-BE49-F238E27FC236}">
-                <a16:creationId xmlns="" xmlns:a16="http://schemas.microsoft.com/office/drawing/2014/main" id="{30BCBBD9-909E-406E-8676-FD33687AC91B}"/>
+                <a16:creationId xmlns:a16="http://schemas.microsoft.com/office/drawing/2014/main" id="{30BCBBD9-909E-406E-8676-FD33687AC91B}"/>
               </a:ext>
             </a:extLst>
           </p:cNvPr>
@@ -6597,13 +6367,6 @@
   <p:clrMapOvr>
     <a:masterClrMapping/>
   </p:clrMapOvr>
-  <p:timing>
-    <p:tnLst>
-      <p:par>
-        <p:cTn id="1" dur="indefinite" restart="never" nodeType="tmRoot"/>
-      </p:par>
-    </p:tnLst>
-  </p:timing>
 </p:sld>
 </file>
 
@@ -6629,7 +6392,7 @@
           <p:cNvPr id="2" name="Title 1">
             <a:extLst>
               <a:ext uri="{FF2B5EF4-FFF2-40B4-BE49-F238E27FC236}">
-                <a16:creationId xmlns="" xmlns:a16="http://schemas.microsoft.com/office/drawing/2014/main" id="{209DA1CA-47D3-4D05-B217-1D3D6340DA60}"/>
+                <a16:creationId xmlns:a16="http://schemas.microsoft.com/office/drawing/2014/main" id="{209DA1CA-47D3-4D05-B217-1D3D6340DA60}"/>
               </a:ext>
             </a:extLst>
           </p:cNvPr>
@@ -6659,7 +6422,7 @@
           <p:cNvPr id="3" name="Content Placeholder 2">
             <a:extLst>
               <a:ext uri="{FF2B5EF4-FFF2-40B4-BE49-F238E27FC236}">
-                <a16:creationId xmlns="" xmlns:a16="http://schemas.microsoft.com/office/drawing/2014/main" id="{639DBA77-9546-4615-9910-9191654884F4}"/>
+                <a16:creationId xmlns:a16="http://schemas.microsoft.com/office/drawing/2014/main" id="{639DBA77-9546-4615-9910-9191654884F4}"/>
               </a:ext>
             </a:extLst>
           </p:cNvPr>
@@ -6731,7 +6494,7 @@
           <p:cNvPr id="2050" name="Picture 2" descr="Pacman PNG Transparent Images | PNG All">
             <a:extLst>
               <a:ext uri="{FF2B5EF4-FFF2-40B4-BE49-F238E27FC236}">
-                <a16:creationId xmlns="" xmlns:a16="http://schemas.microsoft.com/office/drawing/2014/main" id="{7515CF2C-6BF3-40B9-B65D-FAA2CD1B6149}"/>
+                <a16:creationId xmlns:a16="http://schemas.microsoft.com/office/drawing/2014/main" id="{7515CF2C-6BF3-40B9-B65D-FAA2CD1B6149}"/>
               </a:ext>
             </a:extLst>
           </p:cNvPr>
@@ -6778,7 +6541,7 @@
           <p:cNvPr id="2052" name="Picture 4" descr="STRING_SPLIT – New function in SQL Server 2016 - Simple BI Insights">
             <a:extLst>
               <a:ext uri="{FF2B5EF4-FFF2-40B4-BE49-F238E27FC236}">
-                <a16:creationId xmlns="" xmlns:a16="http://schemas.microsoft.com/office/drawing/2014/main" id="{71147A6D-9DA5-44A3-B742-706E37917183}"/>
+                <a16:creationId xmlns:a16="http://schemas.microsoft.com/office/drawing/2014/main" id="{71147A6D-9DA5-44A3-B742-706E37917183}"/>
               </a:ext>
             </a:extLst>
           </p:cNvPr>
@@ -6825,7 +6588,7 @@
           <p:cNvPr id="2054" name="Picture 6" descr="Html5 Js Css3 Logo Png">
             <a:extLst>
               <a:ext uri="{FF2B5EF4-FFF2-40B4-BE49-F238E27FC236}">
-                <a16:creationId xmlns="" xmlns:a16="http://schemas.microsoft.com/office/drawing/2014/main" id="{749567B7-FE78-4927-AF0A-C2D0FBA81B85}"/>
+                <a16:creationId xmlns:a16="http://schemas.microsoft.com/office/drawing/2014/main" id="{749567B7-FE78-4927-AF0A-C2D0FBA81B85}"/>
               </a:ext>
             </a:extLst>
           </p:cNvPr>
@@ -6877,13 +6640,6 @@
   <p:clrMapOvr>
     <a:masterClrMapping/>
   </p:clrMapOvr>
-  <p:timing>
-    <p:tnLst>
-      <p:par>
-        <p:cTn id="1" dur="indefinite" restart="never" nodeType="tmRoot"/>
-      </p:par>
-    </p:tnLst>
-  </p:timing>
 </p:sld>
 </file>
 
@@ -6909,7 +6665,7 @@
           <p:cNvPr id="2" name="Title 1">
             <a:extLst>
               <a:ext uri="{FF2B5EF4-FFF2-40B4-BE49-F238E27FC236}">
-                <a16:creationId xmlns="" xmlns:a16="http://schemas.microsoft.com/office/drawing/2014/main" id="{4889FEBC-A69A-4797-B8DC-F4B395652789}"/>
+                <a16:creationId xmlns:a16="http://schemas.microsoft.com/office/drawing/2014/main" id="{4889FEBC-A69A-4797-B8DC-F4B395652789}"/>
               </a:ext>
             </a:extLst>
           </p:cNvPr>
@@ -6939,7 +6695,7 @@
           <p:cNvPr id="3074" name="Picture 2" descr="Volo Media Ltd">
             <a:extLst>
               <a:ext uri="{FF2B5EF4-FFF2-40B4-BE49-F238E27FC236}">
-                <a16:creationId xmlns="" xmlns:a16="http://schemas.microsoft.com/office/drawing/2014/main" id="{BA229DD6-CF23-437B-A451-61EB32F02DB5}"/>
+                <a16:creationId xmlns:a16="http://schemas.microsoft.com/office/drawing/2014/main" id="{BA229DD6-CF23-437B-A451-61EB32F02DB5}"/>
               </a:ext>
             </a:extLst>
           </p:cNvPr>
@@ -6985,7 +6741,7 @@
           <p:cNvPr id="3076" name="Picture 4" descr="The Expatriates Unit is Moving | Identity Malta Agency">
             <a:extLst>
               <a:ext uri="{FF2B5EF4-FFF2-40B4-BE49-F238E27FC236}">
-                <a16:creationId xmlns="" xmlns:a16="http://schemas.microsoft.com/office/drawing/2014/main" id="{A9B93970-B8A9-48CC-BE47-4932186D0E86}"/>
+                <a16:creationId xmlns:a16="http://schemas.microsoft.com/office/drawing/2014/main" id="{A9B93970-B8A9-48CC-BE47-4932186D0E86}"/>
               </a:ext>
             </a:extLst>
           </p:cNvPr>
@@ -7031,7 +6787,7 @@
           <p:cNvPr id="4" name="TextBox 3">
             <a:extLst>
               <a:ext uri="{FF2B5EF4-FFF2-40B4-BE49-F238E27FC236}">
-                <a16:creationId xmlns="" xmlns:a16="http://schemas.microsoft.com/office/drawing/2014/main" id="{3B8E3796-AD26-4CE1-863F-B774C603C88A}"/>
+                <a16:creationId xmlns:a16="http://schemas.microsoft.com/office/drawing/2014/main" id="{3B8E3796-AD26-4CE1-863F-B774C603C88A}"/>
               </a:ext>
             </a:extLst>
           </p:cNvPr>
@@ -7090,15 +6846,7 @@
             </a:r>
             <a:r>
               <a:rPr lang="en-GB" dirty="0"/>
-              <a:t>at Identity </a:t>
-            </a:r>
-            <a:r>
-              <a:rPr lang="en-GB" dirty="0" smtClean="0"/>
-              <a:t>Malta Agency, </a:t>
-            </a:r>
-            <a:r>
-              <a:rPr lang="en-GB" dirty="0"/>
-              <a:t>Msida </a:t>
+              <a:t>at Identity Malta Agency, Msida </a:t>
             </a:r>
             <a:r>
               <a:rPr lang="en-GB" sz="1400" dirty="0"/>
@@ -7134,13 +6882,6 @@
   <p:clrMapOvr>
     <a:masterClrMapping/>
   </p:clrMapOvr>
-  <p:timing>
-    <p:tnLst>
-      <p:par>
-        <p:cTn id="1" dur="indefinite" restart="never" nodeType="tmRoot"/>
-      </p:par>
-    </p:tnLst>
-  </p:timing>
 </p:sld>
 </file>
 
@@ -7166,7 +6907,7 @@
           <p:cNvPr id="2" name="Title 1">
             <a:extLst>
               <a:ext uri="{FF2B5EF4-FFF2-40B4-BE49-F238E27FC236}">
-                <a16:creationId xmlns="" xmlns:a16="http://schemas.microsoft.com/office/drawing/2014/main" id="{C147DAC6-CE16-464E-B5F7-9AF616F8E344}"/>
+                <a16:creationId xmlns:a16="http://schemas.microsoft.com/office/drawing/2014/main" id="{C147DAC6-CE16-464E-B5F7-9AF616F8E344}"/>
               </a:ext>
             </a:extLst>
           </p:cNvPr>
@@ -7202,7 +6943,7 @@
           <p:cNvPr id="3" name="Content Placeholder 2">
             <a:extLst>
               <a:ext uri="{FF2B5EF4-FFF2-40B4-BE49-F238E27FC236}">
-                <a16:creationId xmlns="" xmlns:a16="http://schemas.microsoft.com/office/drawing/2014/main" id="{4B168DC9-6117-41A0-BD4F-7F02B94E446E}"/>
+                <a16:creationId xmlns:a16="http://schemas.microsoft.com/office/drawing/2014/main" id="{4B168DC9-6117-41A0-BD4F-7F02B94E446E}"/>
               </a:ext>
             </a:extLst>
           </p:cNvPr>
@@ -7255,13 +6996,6 @@
   <p:clrMapOvr>
     <a:masterClrMapping/>
   </p:clrMapOvr>
-  <p:timing>
-    <p:tnLst>
-      <p:par>
-        <p:cTn id="1" dur="indefinite" restart="never" nodeType="tmRoot"/>
-      </p:par>
-    </p:tnLst>
-  </p:timing>
 </p:sld>
 </file>
 
@@ -7287,7 +7021,7 @@
           <p:cNvPr id="2" name="Title 1">
             <a:extLst>
               <a:ext uri="{FF2B5EF4-FFF2-40B4-BE49-F238E27FC236}">
-                <a16:creationId xmlns="" xmlns:a16="http://schemas.microsoft.com/office/drawing/2014/main" id="{EFB4BB4F-2949-44F7-AB57-F37817610597}"/>
+                <a16:creationId xmlns:a16="http://schemas.microsoft.com/office/drawing/2014/main" id="{EFB4BB4F-2949-44F7-AB57-F37817610597}"/>
               </a:ext>
             </a:extLst>
           </p:cNvPr>
@@ -7316,7 +7050,7 @@
           <p:cNvPr id="3" name="Content Placeholder 2">
             <a:extLst>
               <a:ext uri="{FF2B5EF4-FFF2-40B4-BE49-F238E27FC236}">
-                <a16:creationId xmlns="" xmlns:a16="http://schemas.microsoft.com/office/drawing/2014/main" id="{016F4155-F3AA-4278-813E-93BF917DA27E}"/>
+                <a16:creationId xmlns:a16="http://schemas.microsoft.com/office/drawing/2014/main" id="{016F4155-F3AA-4278-813E-93BF917DA27E}"/>
               </a:ext>
             </a:extLst>
           </p:cNvPr>
@@ -7343,7 +7077,23 @@
                 <a:ea typeface="Calibri" panose="020F0502020204030204" pitchFamily="34" charset="0"/>
                 <a:cs typeface="Times New Roman" panose="02020603050405020304" pitchFamily="18" charset="0"/>
               </a:rPr>
-              <a:t>Client-side scripting allows easy and quick form validation whereby the page does not need to be reloaded. Submission events can be fired to prevent user from submitting if any fields are incomplete.</a:t>
+              <a:t>Client-side scripting allows easy and quick form validation whereby the page does not need to be reloaded. Submission events can be fired to </a:t>
+            </a:r>
+            <a:r>
+              <a:rPr lang="en-US" sz="1600">
+                <a:effectLst/>
+                <a:ea typeface="Calibri" panose="020F0502020204030204" pitchFamily="34" charset="0"/>
+                <a:cs typeface="Times New Roman" panose="02020603050405020304" pitchFamily="18" charset="0"/>
+              </a:rPr>
+              <a:t>prevent the form </a:t>
+            </a:r>
+            <a:r>
+              <a:rPr lang="en-US" sz="1600" dirty="0">
+                <a:effectLst/>
+                <a:ea typeface="Calibri" panose="020F0502020204030204" pitchFamily="34" charset="0"/>
+                <a:cs typeface="Times New Roman" panose="02020603050405020304" pitchFamily="18" charset="0"/>
+              </a:rPr>
+              <a:t>from submitting if any fields are incomplete.</a:t>
             </a:r>
             <a:endParaRPr lang="en-MT" sz="1600" dirty="0">
               <a:effectLst/>
@@ -7488,13 +7238,6 @@
   <p:clrMapOvr>
     <a:masterClrMapping/>
   </p:clrMapOvr>
-  <p:timing>
-    <p:tnLst>
-      <p:par>
-        <p:cTn id="1" dur="indefinite" restart="never" nodeType="tmRoot"/>
-      </p:par>
-    </p:tnLst>
-  </p:timing>
 </p:sld>
 </file>
 
@@ -7531,7 +7274,7 @@
           <a:lstStyle/>
           <a:p>
             <a:r>
-              <a:rPr lang="en-GB" dirty="0" smtClean="0"/>
+              <a:rPr lang="en-GB" dirty="0"/>
               <a:t>Web browsers</a:t>
             </a:r>
             <a:endParaRPr lang="en-US" dirty="0"/>
@@ -7557,7 +7300,7 @@
               <a:buNone/>
             </a:pPr>
             <a:r>
-              <a:rPr lang="en-GB" dirty="0" smtClean="0"/>
+              <a:rPr lang="en-GB" dirty="0"/>
               <a:t>In its simplest terms, a web browser (otherwise shortened to the term browser) is a software application enabling access of information on the World Wide Web. Whenever the user requests to access a webpage of a website (through search engines or address bar), a web server will retrieve the contents of the web page which is subsequently displayed on the user’s device. To date, the most popular browser is Google Chrome. Nowadays, browsers are available for a plethora of devices, namely desktop PCs, laptops, smartphones, tablets and even the Raspberry Pi.</a:t>
             </a:r>
             <a:endParaRPr lang="en-US" dirty="0"/>
@@ -7615,13 +7358,6 @@
   <p:clrMapOvr>
     <a:masterClrMapping/>
   </p:clrMapOvr>
-  <p:timing>
-    <p:tnLst>
-      <p:par>
-        <p:cTn id="1" dur="indefinite" restart="never" nodeType="tmRoot"/>
-      </p:par>
-    </p:tnLst>
-  </p:timing>
 </p:sld>
 </file>
 
@@ -7663,7 +7399,7 @@
           <a:lstStyle/>
           <a:p>
             <a:r>
-              <a:rPr lang="en-GB" dirty="0" smtClean="0"/>
+              <a:rPr lang="en-GB" dirty="0"/>
               <a:t>Google Chrome</a:t>
             </a:r>
             <a:endParaRPr lang="en-US" dirty="0"/>
@@ -7714,15 +7450,7 @@
             </a:pPr>
             <a:r>
               <a:rPr lang="en-GB" dirty="0"/>
-              <a:t>Moreover, Google Chrome comes with a Task Manager where users can see how many resources (CPU usage and memory) are allocated to each tab and extension. One can easily eliminate a tab, otherwise known as a process, in case of </a:t>
-            </a:r>
-            <a:r>
-              <a:rPr lang="en-GB" dirty="0" smtClean="0"/>
-              <a:t>misbehaviour</a:t>
-            </a:r>
-            <a:r>
-              <a:rPr lang="en-GB" dirty="0"/>
-              <a:t>. </a:t>
+              <a:t>Moreover, Google Chrome comes with a Task Manager where users can see how many resources (CPU usage and memory) are allocated to each tab and extension. One can easily eliminate a tab, otherwise known as a process, in case of misbehaviour. </a:t>
             </a:r>
           </a:p>
         </p:txBody>
@@ -8058,23 +7786,6 @@
 </file>
 
 <file path=customXml/item1.xml><?xml version="1.0" encoding="utf-8"?>
-<p:properties xmlns:p="http://schemas.microsoft.com/office/2006/metadata/properties" xmlns:xsi="http://www.w3.org/2001/XMLSchema-instance" xmlns:pc="http://schemas.microsoft.com/office/infopath/2007/PartnerControls">
-  <documentManagement>
-    <MediaServiceKeyPoints xmlns="d9d9ac22-6b23-4745-92ea-c69becf7e4b2" xsi:nil="true"/>
-  </documentManagement>
-</p:properties>
-</file>
-
-<file path=customXml/item2.xml><?xml version="1.0" encoding="utf-8"?>
-<?mso-contentType ?>
-<FormTemplates xmlns="http://schemas.microsoft.com/sharepoint/v3/contenttype/forms">
-  <Display>DocumentLibraryForm</Display>
-  <Edit>DocumentLibraryForm</Edit>
-  <New>DocumentLibraryForm</New>
-</FormTemplates>
-</file>
-
-<file path=customXml/item3.xml><?xml version="1.0" encoding="utf-8"?>
 <ct:contentTypeSchema xmlns:ct="http://schemas.microsoft.com/office/2006/metadata/contentType" xmlns:ma="http://schemas.microsoft.com/office/2006/metadata/properties/metaAttributes" ct:_="" ma:_="" ma:contentTypeName="Document" ma:contentTypeID="0x01010099EA05292F43AC468E47792DE7151F8D" ma:contentTypeVersion="13" ma:contentTypeDescription="Create a new document." ma:contentTypeScope="" ma:versionID="803ad2c30b9a0a334f48b490dafeb011">
   <xsd:schema xmlns:xsd="http://www.w3.org/2001/XMLSchema" xmlns:xs="http://www.w3.org/2001/XMLSchema" xmlns:p="http://schemas.microsoft.com/office/2006/metadata/properties" xmlns:ns3="d9d9ac22-6b23-4745-92ea-c69becf7e4b2" xmlns:ns4="45676021-86ec-45db-8abb-edbe2c2c4101" targetNamespace="http://schemas.microsoft.com/office/2006/metadata/properties" ma:root="true" ma:fieldsID="3af67083b40321adf5c8791a7cec23ac" ns3:_="" ns4:_="">
     <xsd:import namespace="d9d9ac22-6b23-4745-92ea-c69becf7e4b2"/>
@@ -8297,32 +8008,24 @@
 </ct:contentTypeSchema>
 </file>
 
-<file path=customXml/itemProps1.xml><?xml version="1.0" encoding="utf-8"?>
-<ds:datastoreItem xmlns:ds="http://schemas.openxmlformats.org/officeDocument/2006/customXml" ds:itemID="{137651BA-F45C-4845-9AB3-E0A65B39F5E1}">
-  <ds:schemaRefs>
-    <ds:schemaRef ds:uri="http://schemas.microsoft.com/office/2006/metadata/properties"/>
-    <ds:schemaRef ds:uri="http://purl.org/dc/terms/"/>
-    <ds:schemaRef ds:uri="d9d9ac22-6b23-4745-92ea-c69becf7e4b2"/>
-    <ds:schemaRef ds:uri="45676021-86ec-45db-8abb-edbe2c2c4101"/>
-    <ds:schemaRef ds:uri="http://schemas.microsoft.com/office/2006/documentManagement/types"/>
-    <ds:schemaRef ds:uri="http://schemas.microsoft.com/office/infopath/2007/PartnerControls"/>
-    <ds:schemaRef ds:uri="http://purl.org/dc/elements/1.1/"/>
-    <ds:schemaRef ds:uri="http://schemas.openxmlformats.org/package/2006/metadata/core-properties"/>
-    <ds:schemaRef ds:uri="http://www.w3.org/XML/1998/namespace"/>
-    <ds:schemaRef ds:uri="http://purl.org/dc/dcmitype/"/>
-  </ds:schemaRefs>
-</ds:datastoreItem>
+<file path=customXml/item2.xml><?xml version="1.0" encoding="utf-8"?>
+<?mso-contentType ?>
+<FormTemplates xmlns="http://schemas.microsoft.com/sharepoint/v3/contenttype/forms">
+  <Display>DocumentLibraryForm</Display>
+  <Edit>DocumentLibraryForm</Edit>
+  <New>DocumentLibraryForm</New>
+</FormTemplates>
 </file>
 
-<file path=customXml/itemProps2.xml><?xml version="1.0" encoding="utf-8"?>
-<ds:datastoreItem xmlns:ds="http://schemas.openxmlformats.org/officeDocument/2006/customXml" ds:itemID="{CDB58277-F8DF-46FF-84EC-EF41B835E69F}">
-  <ds:schemaRefs>
-    <ds:schemaRef ds:uri="http://schemas.microsoft.com/sharepoint/v3/contenttype/forms"/>
-  </ds:schemaRefs>
-</ds:datastoreItem>
+<file path=customXml/item3.xml><?xml version="1.0" encoding="utf-8"?>
+<p:properties xmlns:p="http://schemas.microsoft.com/office/2006/metadata/properties" xmlns:xsi="http://www.w3.org/2001/XMLSchema-instance" xmlns:pc="http://schemas.microsoft.com/office/infopath/2007/PartnerControls">
+  <documentManagement>
+    <MediaServiceKeyPoints xmlns="d9d9ac22-6b23-4745-92ea-c69becf7e4b2" xsi:nil="true"/>
+  </documentManagement>
+</p:properties>
 </file>
 
-<file path=customXml/itemProps3.xml><?xml version="1.0" encoding="utf-8"?>
+<file path=customXml/itemProps1.xml><?xml version="1.0" encoding="utf-8"?>
 <ds:datastoreItem xmlns:ds="http://schemas.openxmlformats.org/officeDocument/2006/customXml" ds:itemID="{8D891A2C-7683-4A63-9EAA-400EA9F04214}">
   <ds:schemaRefs>
     <ds:schemaRef ds:uri="http://schemas.microsoft.com/office/2006/metadata/contentType"/>
@@ -8339,4 +8042,29 @@
     <ds:schemaRef ds:uri="http://schemas.microsoft.com/internal/obd"/>
   </ds:schemaRefs>
 </ds:datastoreItem>
+</file>
+
+<file path=customXml/itemProps2.xml><?xml version="1.0" encoding="utf-8"?>
+<ds:datastoreItem xmlns:ds="http://schemas.openxmlformats.org/officeDocument/2006/customXml" ds:itemID="{CDB58277-F8DF-46FF-84EC-EF41B835E69F}">
+  <ds:schemaRefs>
+    <ds:schemaRef ds:uri="http://schemas.microsoft.com/sharepoint/v3/contenttype/forms"/>
+  </ds:schemaRefs>
+</ds:datastoreItem>
+</file>
+
+<file path=customXml/itemProps3.xml><?xml version="1.0" encoding="utf-8"?>
+<ds:datastoreItem xmlns:ds="http://schemas.openxmlformats.org/officeDocument/2006/customXml" ds:itemID="{137651BA-F45C-4845-9AB3-E0A65B39F5E1}">
+  <ds:schemaRefs>
+    <ds:schemaRef ds:uri="http://schemas.microsoft.com/office/2006/metadata/properties"/>
+    <ds:schemaRef ds:uri="http://purl.org/dc/terms/"/>
+    <ds:schemaRef ds:uri="d9d9ac22-6b23-4745-92ea-c69becf7e4b2"/>
+    <ds:schemaRef ds:uri="45676021-86ec-45db-8abb-edbe2c2c4101"/>
+    <ds:schemaRef ds:uri="http://schemas.microsoft.com/office/2006/documentManagement/types"/>
+    <ds:schemaRef ds:uri="http://schemas.microsoft.com/office/infopath/2007/PartnerControls"/>
+    <ds:schemaRef ds:uri="http://purl.org/dc/elements/1.1/"/>
+    <ds:schemaRef ds:uri="http://schemas.openxmlformats.org/package/2006/metadata/core-properties"/>
+    <ds:schemaRef ds:uri="http://www.w3.org/XML/1998/namespace"/>
+    <ds:schemaRef ds:uri="http://purl.org/dc/dcmitype/"/>
+  </ds:schemaRefs>
+</ds:datastoreItem>
 </file>
</xml_diff>